<commit_message>
Präsentation vorerst fertig gestellt
</commit_message>
<xml_diff>
--- a/SegWit Präsentation.pptx
+++ b/SegWit Präsentation.pptx
@@ -5,20 +5,30 @@
     <p:sldMasterId id="2147483648" r:id="rId1"/>
   </p:sldMasterIdLst>
   <p:notesMasterIdLst>
-    <p:notesMasterId r:id="rId10"/>
+    <p:notesMasterId r:id="rId20"/>
   </p:notesMasterIdLst>
   <p:handoutMasterIdLst>
-    <p:handoutMasterId r:id="rId11"/>
+    <p:handoutMasterId r:id="rId21"/>
   </p:handoutMasterIdLst>
   <p:sldIdLst>
     <p:sldId id="264" r:id="rId2"/>
     <p:sldId id="265" r:id="rId3"/>
     <p:sldId id="266" r:id="rId4"/>
-    <p:sldId id="267" r:id="rId5"/>
-    <p:sldId id="268" r:id="rId6"/>
-    <p:sldId id="269" r:id="rId7"/>
-    <p:sldId id="270" r:id="rId8"/>
-    <p:sldId id="271" r:id="rId9"/>
+    <p:sldId id="284" r:id="rId5"/>
+    <p:sldId id="279" r:id="rId6"/>
+    <p:sldId id="276" r:id="rId7"/>
+    <p:sldId id="275" r:id="rId8"/>
+    <p:sldId id="280" r:id="rId9"/>
+    <p:sldId id="277" r:id="rId10"/>
+    <p:sldId id="278" r:id="rId11"/>
+    <p:sldId id="285" r:id="rId12"/>
+    <p:sldId id="269" r:id="rId13"/>
+    <p:sldId id="281" r:id="rId14"/>
+    <p:sldId id="282" r:id="rId15"/>
+    <p:sldId id="283" r:id="rId16"/>
+    <p:sldId id="270" r:id="rId17"/>
+    <p:sldId id="271" r:id="rId18"/>
+    <p:sldId id="272" r:id="rId19"/>
   </p:sldIdLst>
   <p:sldSz cx="9144000" cy="6858000" type="screen4x3"/>
   <p:notesSz cx="9144000" cy="6858000"/>
@@ -190,6 +200,68 @@
 </p:presentation>
 </file>
 
+<file path=ppt/commentAuthors.xml><?xml version="1.0" encoding="utf-8"?>
+<p:cmAuthorLst xmlns:a="http://schemas.openxmlformats.org/drawingml/2006/main" xmlns:r="http://schemas.openxmlformats.org/officeDocument/2006/relationships" xmlns:p="http://schemas.openxmlformats.org/presentationml/2006/main">
+  <p:cmAuthor id="1" name="Stefan Krieg" initials="SK" lastIdx="8" clrIdx="0">
+    <p:extLst>
+      <p:ext uri="{19B8F6BF-5375-455C-9EA6-DF929625EA0E}">
+        <p15:presenceInfo xmlns:p15="http://schemas.microsoft.com/office/powerpoint/2012/main" userId="4b1174fe13c3f503" providerId="Windows Live"/>
+      </p:ext>
+    </p:extLst>
+  </p:cmAuthor>
+</p:cmAuthorLst>
+</file>
+
+<file path=ppt/comments/comment1.xml><?xml version="1.0" encoding="utf-8"?>
+<p:cmLst xmlns:a="http://schemas.openxmlformats.org/drawingml/2006/main" xmlns:r="http://schemas.openxmlformats.org/officeDocument/2006/relationships" xmlns:p="http://schemas.openxmlformats.org/presentationml/2006/main">
+  <p:cm authorId="1" dt="2020-07-06T12:49:56.538" idx="5">
+    <p:pos x="5331" y="3722"/>
+    <p:text>Was sind Probleme?</p:text>
+    <p:extLst>
+      <p:ext uri="{C676402C-5697-4E1C-873F-D02D1690AC5C}">
+        <p15:threadingInfo xmlns:p15="http://schemas.microsoft.com/office/powerpoint/2012/main" timeZoneBias="-120"/>
+      </p:ext>
+    </p:extLst>
+  </p:cm>
+  <p:cm authorId="1" dt="2020-07-06T12:50:28.498" idx="7">
+    <p:pos x="5331" y="3858"/>
+    <p:text>Löst es Probleme theoretisch? Praktisch?</p:text>
+    <p:extLst>
+      <p:ext uri="{C676402C-5697-4E1C-873F-D02D1690AC5C}">
+        <p15:threadingInfo xmlns:p15="http://schemas.microsoft.com/office/powerpoint/2012/main" timeZoneBias="-120">
+          <p15:parentCm authorId="1" idx="5"/>
+        </p15:threadingInfo>
+      </p:ext>
+    </p:extLst>
+  </p:cm>
+  <p:cm authorId="1" dt="2020-07-06T12:50:41.400" idx="8">
+    <p:pos x="5331" y="3994"/>
+    <p:text>Kann es gut umgesetzt werden?</p:text>
+    <p:extLst>
+      <p:ext uri="{C676402C-5697-4E1C-873F-D02D1690AC5C}">
+        <p15:threadingInfo xmlns:p15="http://schemas.microsoft.com/office/powerpoint/2012/main" timeZoneBias="-120">
+          <p15:parentCm authorId="1" idx="5"/>
+        </p15:threadingInfo>
+      </p:ext>
+    </p:extLst>
+  </p:cm>
+</p:cmLst>
+</file>
+
+<file path=ppt/comments/comment2.xml><?xml version="1.0" encoding="utf-8"?>
+<p:cmLst xmlns:a="http://schemas.openxmlformats.org/drawingml/2006/main" xmlns:r="http://schemas.openxmlformats.org/officeDocument/2006/relationships" xmlns:p="http://schemas.openxmlformats.org/presentationml/2006/main">
+  <p:cm authorId="1" dt="2020-07-06T12:14:20.213" idx="4">
+    <p:pos x="5304" y="3621"/>
+    <p:text>8 August 100% of the bitcoin mining pools signaled support for SegWit</p:text>
+    <p:extLst>
+      <p:ext uri="{C676402C-5697-4E1C-873F-D02D1690AC5C}">
+        <p15:threadingInfo xmlns:p15="http://schemas.microsoft.com/office/powerpoint/2012/main" timeZoneBias="-120"/>
+      </p:ext>
+    </p:extLst>
+  </p:cm>
+</p:cmLst>
+</file>
+
 <file path=ppt/handoutMasters/handoutMaster1.xml><?xml version="1.0" encoding="utf-8"?>
 <p:handoutMaster xmlns:a="http://schemas.openxmlformats.org/drawingml/2006/main" xmlns:r="http://schemas.openxmlformats.org/officeDocument/2006/relationships" xmlns:p="http://schemas.openxmlformats.org/presentationml/2006/main">
   <p:cSld>
@@ -1633,17 +1705,10 @@
           </a:lstStyle>
           <a:p>
             <a:r>
-              <a:rPr lang="de-DE" altLang="de-DE" noProof="0" dirty="0"/>
-              <a:t>&lt;</a:t>
-            </a:r>
-            <a:r>
-              <a:rPr lang="de-DE" altLang="de-DE" noProof="0" dirty="0" err="1"/>
-              <a:t>Presenter</a:t>
-            </a:r>
-            <a:r>
-              <a:rPr lang="de-DE" altLang="de-DE" noProof="0" dirty="0"/>
-              <a:t>&gt; - &lt;Title&gt;</a:t>
-            </a:r>
+              <a:rPr lang="de-DE" altLang="de-DE" noProof="0"/>
+              <a:t>Stefan Krieg - Segregated Witness</a:t>
+            </a:r>
+            <a:endParaRPr lang="de-DE" altLang="de-DE" noProof="0" dirty="0"/>
           </a:p>
         </p:txBody>
       </p:sp>
@@ -1680,9 +1745,9 @@
             </a:lvl1pPr>
           </a:lstStyle>
           <a:p>
-            <a:fld id="{097E5A9B-EFEA-49D5-B1E3-8A74103C9BBC}" type="datetime1">
+            <a:fld id="{E4241561-A54D-4175-9587-175F774C365F}" type="datetime1">
               <a:rPr lang="de-DE" noProof="0" smtClean="0"/>
-              <a:t>02.07.2020</a:t>
+              <a:t>05.07.2020</a:t>
             </a:fld>
             <a:endParaRPr lang="de-DE" noProof="0" dirty="0"/>
           </a:p>
@@ -1796,17 +1861,10 @@
           </a:lstStyle>
           <a:p>
             <a:r>
-              <a:rPr lang="de-DE" altLang="de-DE" noProof="0" dirty="0"/>
-              <a:t>&lt;</a:t>
-            </a:r>
-            <a:r>
-              <a:rPr lang="de-DE" altLang="de-DE" noProof="0" dirty="0" err="1"/>
-              <a:t>Presenter</a:t>
-            </a:r>
-            <a:r>
-              <a:rPr lang="de-DE" altLang="de-DE" noProof="0" dirty="0"/>
-              <a:t>&gt; - &lt;Title&gt;</a:t>
-            </a:r>
+              <a:rPr lang="de-DE" altLang="de-DE" noProof="0"/>
+              <a:t>Stefan Krieg - Segregated Witness</a:t>
+            </a:r>
+            <a:endParaRPr lang="de-DE" altLang="de-DE" noProof="0" dirty="0"/>
           </a:p>
         </p:txBody>
       </p:sp>
@@ -1843,9 +1901,9 @@
             </a:lvl1pPr>
           </a:lstStyle>
           <a:p>
-            <a:fld id="{29A111E4-9668-418B-AFA2-A301D6EA6363}" type="datetime1">
+            <a:fld id="{D68325C0-D0E9-4806-8DD3-82FCEAE9BB9D}" type="datetime1">
               <a:rPr lang="de-DE" noProof="0" smtClean="0"/>
-              <a:t>02.07.2020</a:t>
+              <a:t>05.07.2020</a:t>
             </a:fld>
             <a:endParaRPr lang="de-DE" noProof="0" dirty="0"/>
           </a:p>
@@ -1949,17 +2007,10 @@
           </a:lstStyle>
           <a:p>
             <a:r>
-              <a:rPr lang="de-DE" altLang="de-DE" noProof="0" dirty="0"/>
-              <a:t>&lt;</a:t>
-            </a:r>
-            <a:r>
-              <a:rPr lang="de-DE" altLang="de-DE" noProof="0" dirty="0" err="1"/>
-              <a:t>Presenter</a:t>
-            </a:r>
-            <a:r>
-              <a:rPr lang="de-DE" altLang="de-DE" noProof="0" dirty="0"/>
-              <a:t>&gt; - &lt;Title&gt;</a:t>
-            </a:r>
+              <a:rPr lang="de-DE" altLang="de-DE" noProof="0"/>
+              <a:t>Stefan Krieg - Segregated Witness</a:t>
+            </a:r>
+            <a:endParaRPr lang="de-DE" altLang="de-DE" noProof="0" dirty="0"/>
           </a:p>
         </p:txBody>
       </p:sp>
@@ -1996,9 +2047,9 @@
             </a:lvl1pPr>
           </a:lstStyle>
           <a:p>
-            <a:fld id="{7A5B5C66-4F04-4852-AC9C-67C3E6720CC5}" type="datetime1">
+            <a:fld id="{7A7A0B3B-8EF1-43DB-9A05-9913B3E55C42}" type="datetime1">
               <a:rPr lang="de-DE" noProof="0" smtClean="0"/>
-              <a:t>02.07.2020</a:t>
+              <a:t>05.07.2020</a:t>
             </a:fld>
             <a:endParaRPr lang="de-DE" noProof="0" dirty="0"/>
           </a:p>
@@ -2153,17 +2204,10 @@
           </a:lstStyle>
           <a:p>
             <a:r>
-              <a:rPr lang="de-DE" altLang="de-DE" noProof="0" dirty="0"/>
-              <a:t>&lt;</a:t>
-            </a:r>
-            <a:r>
-              <a:rPr lang="de-DE" altLang="de-DE" noProof="0" dirty="0" err="1"/>
-              <a:t>Presenter</a:t>
-            </a:r>
-            <a:r>
-              <a:rPr lang="de-DE" altLang="de-DE" noProof="0" dirty="0"/>
-              <a:t>&gt; - &lt;Title&gt;</a:t>
-            </a:r>
+              <a:rPr lang="de-DE" altLang="de-DE" noProof="0"/>
+              <a:t>Stefan Krieg - Segregated Witness</a:t>
+            </a:r>
+            <a:endParaRPr lang="de-DE" altLang="de-DE" noProof="0" dirty="0"/>
           </a:p>
         </p:txBody>
       </p:sp>
@@ -2200,9 +2244,9 @@
             </a:lvl1pPr>
           </a:lstStyle>
           <a:p>
-            <a:fld id="{05C3F59F-DA9A-49B5-B58C-27F4112D2D9B}" type="datetime1">
+            <a:fld id="{2264CB09-F063-447F-A5D5-08DBE24D7A02}" type="datetime1">
               <a:rPr lang="de-DE" noProof="0" smtClean="0"/>
-              <a:t>02.07.2020</a:t>
+              <a:t>05.07.2020</a:t>
             </a:fld>
             <a:endParaRPr lang="de-DE" noProof="0" dirty="0"/>
           </a:p>
@@ -2395,17 +2439,10 @@
           </a:lstStyle>
           <a:p>
             <a:r>
-              <a:rPr lang="de-DE" altLang="de-DE" noProof="0" dirty="0"/>
-              <a:t>&lt;</a:t>
-            </a:r>
-            <a:r>
-              <a:rPr lang="de-DE" altLang="de-DE" noProof="0" dirty="0" err="1"/>
-              <a:t>Presenter</a:t>
-            </a:r>
-            <a:r>
-              <a:rPr lang="de-DE" altLang="de-DE" noProof="0" dirty="0"/>
-              <a:t>&gt; - &lt;Title&gt;</a:t>
-            </a:r>
+              <a:rPr lang="de-DE" altLang="de-DE" noProof="0"/>
+              <a:t>Stefan Krieg - Segregated Witness</a:t>
+            </a:r>
+            <a:endParaRPr lang="de-DE" altLang="de-DE" noProof="0" dirty="0"/>
           </a:p>
         </p:txBody>
       </p:sp>
@@ -2442,9 +2479,9 @@
             </a:lvl1pPr>
           </a:lstStyle>
           <a:p>
-            <a:fld id="{C82EEAD2-596D-4B01-8B6D-498B80C03F76}" type="datetime1">
+            <a:fld id="{44D01044-AB1D-4DB8-9598-4407792E278A}" type="datetime1">
               <a:rPr lang="de-DE" noProof="0" smtClean="0"/>
-              <a:t>02.07.2020</a:t>
+              <a:t>05.07.2020</a:t>
             </a:fld>
             <a:endParaRPr lang="de-DE" noProof="0" dirty="0"/>
           </a:p>
@@ -2776,17 +2813,10 @@
           </a:lstStyle>
           <a:p>
             <a:r>
-              <a:rPr lang="de-DE" altLang="de-DE" noProof="0" dirty="0"/>
-              <a:t>&lt;</a:t>
-            </a:r>
-            <a:r>
-              <a:rPr lang="de-DE" altLang="de-DE" noProof="0" dirty="0" err="1"/>
-              <a:t>Presenter</a:t>
-            </a:r>
-            <a:r>
-              <a:rPr lang="de-DE" altLang="de-DE" noProof="0" dirty="0"/>
-              <a:t>&gt; - &lt;Title&gt;</a:t>
-            </a:r>
+              <a:rPr lang="de-DE" altLang="de-DE" noProof="0"/>
+              <a:t>Stefan Krieg - Segregated Witness</a:t>
+            </a:r>
+            <a:endParaRPr lang="de-DE" altLang="de-DE" noProof="0" dirty="0"/>
           </a:p>
         </p:txBody>
       </p:sp>
@@ -2823,9 +2853,9 @@
             </a:lvl1pPr>
           </a:lstStyle>
           <a:p>
-            <a:fld id="{2BD5CA12-2ED8-4EFC-8717-4B4AB8BFE509}" type="datetime1">
+            <a:fld id="{66F33B3E-CB26-412B-95D9-7345C46AF3B9}" type="datetime1">
               <a:rPr lang="de-DE" noProof="0" smtClean="0"/>
-              <a:t>02.07.2020</a:t>
+              <a:t>05.07.2020</a:t>
             </a:fld>
             <a:endParaRPr lang="de-DE" noProof="0" dirty="0"/>
           </a:p>
@@ -2906,17 +2936,10 @@
           </a:lstStyle>
           <a:p>
             <a:r>
-              <a:rPr lang="de-DE" altLang="de-DE" noProof="0" dirty="0"/>
-              <a:t>&lt;</a:t>
-            </a:r>
-            <a:r>
-              <a:rPr lang="de-DE" altLang="de-DE" noProof="0" dirty="0" err="1"/>
-              <a:t>Presenter</a:t>
-            </a:r>
-            <a:r>
-              <a:rPr lang="de-DE" altLang="de-DE" noProof="0" dirty="0"/>
-              <a:t>&gt; - &lt;Title&gt;</a:t>
-            </a:r>
+              <a:rPr lang="de-DE" altLang="de-DE" noProof="0"/>
+              <a:t>Stefan Krieg - Segregated Witness</a:t>
+            </a:r>
+            <a:endParaRPr lang="de-DE" altLang="de-DE" noProof="0" dirty="0"/>
           </a:p>
         </p:txBody>
       </p:sp>
@@ -2953,9 +2976,9 @@
             </a:lvl1pPr>
           </a:lstStyle>
           <a:p>
-            <a:fld id="{89D19FA8-4311-4EDD-8A22-BBBD013965C4}" type="datetime1">
+            <a:fld id="{192F68DB-2E70-49BF-BBD9-CFB0841BBE78}" type="datetime1">
               <a:rPr lang="de-DE" noProof="0" smtClean="0"/>
-              <a:t>02.07.2020</a:t>
+              <a:t>05.07.2020</a:t>
             </a:fld>
             <a:endParaRPr lang="de-DE" noProof="0" dirty="0"/>
           </a:p>
@@ -3013,17 +3036,10 @@
           </a:lstStyle>
           <a:p>
             <a:r>
-              <a:rPr lang="de-DE" altLang="de-DE" noProof="0" dirty="0"/>
-              <a:t>&lt;</a:t>
-            </a:r>
-            <a:r>
-              <a:rPr lang="de-DE" altLang="de-DE" noProof="0" dirty="0" err="1"/>
-              <a:t>Presenter</a:t>
-            </a:r>
-            <a:r>
-              <a:rPr lang="de-DE" altLang="de-DE" noProof="0" dirty="0"/>
-              <a:t>&gt; - &lt;Title&gt;</a:t>
-            </a:r>
+              <a:rPr lang="de-DE" altLang="de-DE" noProof="0"/>
+              <a:t>Stefan Krieg - Segregated Witness</a:t>
+            </a:r>
+            <a:endParaRPr lang="de-DE" altLang="de-DE" noProof="0" dirty="0"/>
           </a:p>
         </p:txBody>
       </p:sp>
@@ -3060,9 +3076,9 @@
             </a:lvl1pPr>
           </a:lstStyle>
           <a:p>
-            <a:fld id="{BC4A2F7B-68D4-433C-AAE6-80FB12C38EC4}" type="datetime1">
+            <a:fld id="{0E7749FF-80CE-48E3-9D2D-85867FCD3DF1}" type="datetime1">
               <a:rPr lang="de-DE" noProof="0" smtClean="0"/>
-              <a:t>02.07.2020</a:t>
+              <a:t>05.07.2020</a:t>
             </a:fld>
             <a:endParaRPr lang="de-DE" noProof="0" dirty="0"/>
           </a:p>
@@ -3273,17 +3289,10 @@
           </a:lstStyle>
           <a:p>
             <a:r>
-              <a:rPr lang="de-DE" altLang="de-DE" noProof="0" dirty="0"/>
-              <a:t>&lt;</a:t>
-            </a:r>
-            <a:r>
-              <a:rPr lang="de-DE" altLang="de-DE" noProof="0" dirty="0" err="1"/>
-              <a:t>Presenter</a:t>
-            </a:r>
-            <a:r>
-              <a:rPr lang="de-DE" altLang="de-DE" noProof="0" dirty="0"/>
-              <a:t>&gt; - &lt;Title&gt;</a:t>
-            </a:r>
+              <a:rPr lang="de-DE" altLang="de-DE" noProof="0"/>
+              <a:t>Stefan Krieg - Segregated Witness</a:t>
+            </a:r>
+            <a:endParaRPr lang="de-DE" altLang="de-DE" noProof="0" dirty="0"/>
           </a:p>
         </p:txBody>
       </p:sp>
@@ -3320,9 +3329,9 @@
             </a:lvl1pPr>
           </a:lstStyle>
           <a:p>
-            <a:fld id="{20BE0CA7-AC87-4EA2-9E5E-5ECD7E546197}" type="datetime1">
+            <a:fld id="{A9DA867D-DCC8-4BF5-BA9A-D8A1A5E80877}" type="datetime1">
               <a:rPr lang="de-DE" noProof="0" smtClean="0"/>
-              <a:t>02.07.2020</a:t>
+              <a:t>05.07.2020</a:t>
             </a:fld>
             <a:endParaRPr lang="de-DE" noProof="0" dirty="0"/>
           </a:p>
@@ -3543,17 +3552,10 @@
           </a:lstStyle>
           <a:p>
             <a:r>
-              <a:rPr lang="de-DE" altLang="de-DE" noProof="0" dirty="0"/>
-              <a:t>&lt;</a:t>
-            </a:r>
-            <a:r>
-              <a:rPr lang="de-DE" altLang="de-DE" noProof="0" dirty="0" err="1"/>
-              <a:t>Presenter</a:t>
-            </a:r>
-            <a:r>
-              <a:rPr lang="de-DE" altLang="de-DE" noProof="0" dirty="0"/>
-              <a:t>&gt; - &lt;Title&gt;</a:t>
-            </a:r>
+              <a:rPr lang="de-DE" altLang="de-DE" noProof="0"/>
+              <a:t>Stefan Krieg - Segregated Witness</a:t>
+            </a:r>
+            <a:endParaRPr lang="de-DE" altLang="de-DE" noProof="0" dirty="0"/>
           </a:p>
         </p:txBody>
       </p:sp>
@@ -3590,9 +3592,9 @@
             </a:lvl1pPr>
           </a:lstStyle>
           <a:p>
-            <a:fld id="{8FDA9FBB-95E9-4B08-9DF2-3B2FEF7234A8}" type="datetime1">
+            <a:fld id="{5EB5868C-2C1A-436F-A4F4-A53356CBD78D}" type="datetime1">
               <a:rPr lang="de-DE" noProof="0" smtClean="0"/>
-              <a:t>02.07.2020</a:t>
+              <a:t>05.07.2020</a:t>
             </a:fld>
             <a:endParaRPr lang="de-DE" noProof="0" dirty="0"/>
           </a:p>
@@ -4171,17 +4173,10 @@
           </a:lstStyle>
           <a:p>
             <a:r>
-              <a:rPr lang="de-DE" altLang="de-DE" noProof="0" dirty="0"/>
-              <a:t>&lt;</a:t>
-            </a:r>
-            <a:r>
-              <a:rPr lang="de-DE" altLang="de-DE" noProof="0" dirty="0" err="1"/>
-              <a:t>Presenter</a:t>
-            </a:r>
-            <a:r>
-              <a:rPr lang="de-DE" altLang="de-DE" noProof="0" dirty="0"/>
-              <a:t>&gt; - &lt;Title&gt;</a:t>
-            </a:r>
+              <a:rPr lang="de-DE" altLang="de-DE" noProof="0"/>
+              <a:t>Stefan Krieg - Segregated Witness</a:t>
+            </a:r>
+            <a:endParaRPr lang="de-DE" altLang="de-DE" noProof="0" dirty="0"/>
           </a:p>
         </p:txBody>
       </p:sp>
@@ -4272,9 +4267,9 @@
             </a:lvl1pPr>
           </a:lstStyle>
           <a:p>
-            <a:fld id="{9B43B742-7080-4509-BC98-4990C9E6DEEC}" type="datetime1">
+            <a:fld id="{B3FA0B82-C279-4EE0-92B5-22804A8CF06E}" type="datetime1">
               <a:rPr lang="de-DE" noProof="0" smtClean="0"/>
-              <a:t>02.07.2020</a:t>
+              <a:t>05.07.2020</a:t>
             </a:fld>
             <a:endParaRPr lang="de-DE" noProof="0" dirty="0"/>
           </a:p>
@@ -4691,6 +4686,14 @@
 <file path=ppt/slides/slide1.xml><?xml version="1.0" encoding="utf-8"?>
 <p:sld xmlns:a="http://schemas.openxmlformats.org/drawingml/2006/main" xmlns:r="http://schemas.openxmlformats.org/officeDocument/2006/relationships" xmlns:p="http://schemas.openxmlformats.org/presentationml/2006/main">
   <p:cSld>
+    <p:bg>
+      <p:bgPr>
+        <a:solidFill>
+          <a:schemeClr val="bg1"/>
+        </a:solidFill>
+        <a:effectLst/>
+      </p:bgPr>
+    </p:bg>
     <p:spTree>
       <p:nvGrpSpPr>
         <p:cNvPr id="1" name=""/>
@@ -4852,16 +4855,25 @@
               </a:lnSpc>
             </a:pPr>
             <a:r>
-              <a:rPr lang="de-DE" altLang="de-DE" sz="2600" dirty="0"/>
-              <a:t>Titel</a:t>
+              <a:rPr lang="de-DE" sz="2800" dirty="0"/>
+              <a:t>SS 2020 Proseminar: Bitcoin &amp; Blockchain</a:t>
             </a:r>
             <a:br>
               <a:rPr lang="de-DE" altLang="de-DE" sz="2600" dirty="0"/>
             </a:br>
             <a:r>
+              <a:rPr lang="de-DE" altLang="de-DE" sz="2200" dirty="0" err="1"/>
+              <a:t>Segregated</a:t>
+            </a:r>
+            <a:r>
               <a:rPr lang="de-DE" altLang="de-DE" sz="2200" dirty="0"/>
-              <a:t>Zweizeilig kleiner</a:t>
-            </a:r>
+              <a:t> </a:t>
+            </a:r>
+            <a:r>
+              <a:rPr lang="de-DE" altLang="de-DE" sz="2200" dirty="0" err="1"/>
+              <a:t>Witness</a:t>
+            </a:r>
+            <a:endParaRPr lang="de-DE" altLang="de-DE" sz="2200" dirty="0"/>
           </a:p>
         </p:txBody>
       </p:sp>
@@ -5032,12 +5044,1792 @@
                   <a:srgbClr val="000000"/>
                 </a:solidFill>
               </a:rPr>
-              <a:t>Untertitel</a:t>
-            </a:r>
+              <a:t>Stefan Krieg</a:t>
+            </a:r>
+          </a:p>
+        </p:txBody>
+      </p:sp>
+      <p:pic>
+        <p:nvPicPr>
+          <p:cNvPr id="3" name="Grafik 2" descr="Ein Bild, das Zeichnung enthält.&#10;&#10;Automatisch generierte Beschreibung">
+            <a:extLst>
+              <a:ext uri="{FF2B5EF4-FFF2-40B4-BE49-F238E27FC236}">
+                <a16:creationId xmlns:a16="http://schemas.microsoft.com/office/drawing/2014/main" id="{0D6B4B3C-892A-466C-A412-8B9D10FC3633}"/>
+              </a:ext>
+            </a:extLst>
+          </p:cNvPr>
+          <p:cNvPicPr>
+            <a:picLocks noChangeAspect="1"/>
+          </p:cNvPicPr>
+          <p:nvPr/>
+        </p:nvPicPr>
+        <p:blipFill>
+          <a:blip r:embed="rId2" cstate="print">
+            <a:extLst>
+              <a:ext uri="{28A0092B-C50C-407E-A947-70E740481C1C}">
+                <a14:useLocalDpi xmlns:a14="http://schemas.microsoft.com/office/drawing/2010/main" val="0"/>
+              </a:ext>
+            </a:extLst>
+          </a:blip>
+          <a:stretch>
+            <a:fillRect/>
+          </a:stretch>
+        </p:blipFill>
+        <p:spPr>
+          <a:xfrm>
+            <a:off x="374193" y="3887788"/>
+            <a:ext cx="8370888" cy="2122598"/>
+          </a:xfrm>
+          <a:prstGeom prst="rect">
+            <a:avLst/>
+          </a:prstGeom>
+        </p:spPr>
+      </p:pic>
+      <p:sp>
+        <p:nvSpPr>
+          <p:cNvPr id="4" name="Textfeld 3">
+            <a:extLst>
+              <a:ext uri="{FF2B5EF4-FFF2-40B4-BE49-F238E27FC236}">
+                <a16:creationId xmlns:a16="http://schemas.microsoft.com/office/drawing/2014/main" id="{2D498708-1309-493B-8FC8-30F3AD0B8577}"/>
+              </a:ext>
+            </a:extLst>
+          </p:cNvPr>
+          <p:cNvSpPr txBox="1"/>
+          <p:nvPr/>
+        </p:nvSpPr>
+        <p:spPr>
+          <a:xfrm>
+            <a:off x="2790647" y="6010386"/>
+            <a:ext cx="3562705" cy="246221"/>
+          </a:xfrm>
+          <a:prstGeom prst="rect">
+            <a:avLst/>
+          </a:prstGeom>
+          <a:noFill/>
+        </p:spPr>
+        <p:txBody>
+          <a:bodyPr wrap="square" rtlCol="0">
+            <a:spAutoFit/>
+          </a:bodyPr>
+          <a:lstStyle/>
+          <a:p>
+            <a:r>
+              <a:rPr lang="de-DE" sz="1000" dirty="0"/>
+              <a:t>Bildquelle: </a:t>
+            </a:r>
+            <a:r>
+              <a:rPr lang="de-DE" sz="1000" dirty="0">
+                <a:hlinkClick r:id="rId3"/>
+              </a:rPr>
+              <a:t>https://en.bitcoin.it/w/images/en/4/49/Segwit.png</a:t>
+            </a:r>
+            <a:endParaRPr lang="de-DE" sz="1000" dirty="0"/>
           </a:p>
         </p:txBody>
       </p:sp>
     </p:spTree>
+  </p:cSld>
+  <p:clrMapOvr>
+    <a:masterClrMapping/>
+  </p:clrMapOvr>
+</p:sld>
+</file>
+
+<file path=ppt/slides/slide10.xml><?xml version="1.0" encoding="utf-8"?>
+<p:sld xmlns:a="http://schemas.openxmlformats.org/drawingml/2006/main" xmlns:r="http://schemas.openxmlformats.org/officeDocument/2006/relationships" xmlns:p="http://schemas.openxmlformats.org/presentationml/2006/main">
+  <p:cSld>
+    <p:spTree>
+      <p:nvGrpSpPr>
+        <p:cNvPr id="1" name=""/>
+        <p:cNvGrpSpPr/>
+        <p:nvPr/>
+      </p:nvGrpSpPr>
+      <p:grpSpPr>
+        <a:xfrm>
+          <a:off x="0" y="0"/>
+          <a:ext cx="0" cy="0"/>
+          <a:chOff x="0" y="0"/>
+          <a:chExt cx="0" cy="0"/>
+        </a:xfrm>
+      </p:grpSpPr>
+      <p:sp>
+        <p:nvSpPr>
+          <p:cNvPr id="2" name="Titel 1">
+            <a:extLst>
+              <a:ext uri="{FF2B5EF4-FFF2-40B4-BE49-F238E27FC236}">
+                <a16:creationId xmlns:a16="http://schemas.microsoft.com/office/drawing/2014/main" id="{58C0B2EB-B753-40B2-AF44-E68D448243D6}"/>
+              </a:ext>
+            </a:extLst>
+          </p:cNvPr>
+          <p:cNvSpPr>
+            <a:spLocks noGrp="1"/>
+          </p:cNvSpPr>
+          <p:nvPr>
+            <p:ph type="title"/>
+          </p:nvPr>
+        </p:nvSpPr>
+        <p:spPr/>
+        <p:txBody>
+          <a:bodyPr/>
+          <a:lstStyle/>
+          <a:p>
+            <a:r>
+              <a:rPr lang="de-DE" dirty="0"/>
+              <a:t>Skalierbarkeit</a:t>
+            </a:r>
+          </a:p>
+        </p:txBody>
+      </p:sp>
+      <p:sp>
+        <p:nvSpPr>
+          <p:cNvPr id="3" name="Inhaltsplatzhalter 2">
+            <a:extLst>
+              <a:ext uri="{FF2B5EF4-FFF2-40B4-BE49-F238E27FC236}">
+                <a16:creationId xmlns:a16="http://schemas.microsoft.com/office/drawing/2014/main" id="{27C3283A-A144-4D10-B311-CC0008BCB775}"/>
+              </a:ext>
+            </a:extLst>
+          </p:cNvPr>
+          <p:cNvSpPr>
+            <a:spLocks noGrp="1"/>
+          </p:cNvSpPr>
+          <p:nvPr>
+            <p:ph idx="1"/>
+          </p:nvPr>
+        </p:nvSpPr>
+        <p:spPr/>
+        <p:txBody>
+          <a:bodyPr/>
+          <a:lstStyle/>
+          <a:p>
+            <a:r>
+              <a:rPr lang="de-DE" dirty="0"/>
+              <a:t>Blockgröße begrenzt auf 1 MB</a:t>
+            </a:r>
+          </a:p>
+          <a:p>
+            <a:pPr marL="0" indent="0">
+              <a:buNone/>
+            </a:pPr>
+            <a:endParaRPr lang="de-DE" dirty="0"/>
+          </a:p>
+          <a:p>
+            <a:r>
+              <a:rPr lang="de-DE" dirty="0"/>
+              <a:t>Ein Block alle ca. 10 Minuten</a:t>
+            </a:r>
+          </a:p>
+          <a:p>
+            <a:endParaRPr lang="de-DE" dirty="0"/>
+          </a:p>
+          <a:p>
+            <a:pPr marL="0" indent="0">
+              <a:buNone/>
+            </a:pPr>
+            <a:r>
+              <a:rPr lang="de-DE" dirty="0"/>
+              <a:t>→ Maximal ca. 4,6 Transaktionen pro Sekunde</a:t>
+            </a:r>
+          </a:p>
+          <a:p>
+            <a:pPr marL="0" indent="0">
+              <a:buNone/>
+            </a:pPr>
+            <a:r>
+              <a:rPr lang="de-DE" dirty="0"/>
+              <a:t>(Vergleich: Visa 1700/s)</a:t>
+            </a:r>
+          </a:p>
+        </p:txBody>
+      </p:sp>
+      <p:sp>
+        <p:nvSpPr>
+          <p:cNvPr id="4" name="Fußzeilenplatzhalter 3">
+            <a:extLst>
+              <a:ext uri="{FF2B5EF4-FFF2-40B4-BE49-F238E27FC236}">
+                <a16:creationId xmlns:a16="http://schemas.microsoft.com/office/drawing/2014/main" id="{E8258C3D-328A-4377-BC49-C29A25FBDB10}"/>
+              </a:ext>
+            </a:extLst>
+          </p:cNvPr>
+          <p:cNvSpPr>
+            <a:spLocks noGrp="1"/>
+          </p:cNvSpPr>
+          <p:nvPr>
+            <p:ph type="ftr" sz="quarter" idx="10"/>
+          </p:nvPr>
+        </p:nvSpPr>
+        <p:spPr/>
+        <p:txBody>
+          <a:bodyPr/>
+          <a:lstStyle/>
+          <a:p>
+            <a:r>
+              <a:rPr lang="de-DE" altLang="de-DE" noProof="0"/>
+              <a:t>Stefan Krieg - Segregated Witness</a:t>
+            </a:r>
+            <a:endParaRPr lang="de-DE" altLang="de-DE" noProof="0" dirty="0"/>
+          </a:p>
+        </p:txBody>
+      </p:sp>
+      <p:sp>
+        <p:nvSpPr>
+          <p:cNvPr id="5" name="Datumsplatzhalter 4">
+            <a:extLst>
+              <a:ext uri="{FF2B5EF4-FFF2-40B4-BE49-F238E27FC236}">
+                <a16:creationId xmlns:a16="http://schemas.microsoft.com/office/drawing/2014/main" id="{8D34C7BE-DC2F-4800-9AFE-7B256D08D0D2}"/>
+              </a:ext>
+            </a:extLst>
+          </p:cNvPr>
+          <p:cNvSpPr>
+            <a:spLocks noGrp="1"/>
+          </p:cNvSpPr>
+          <p:nvPr>
+            <p:ph type="dt" sz="half" idx="2"/>
+          </p:nvPr>
+        </p:nvSpPr>
+        <p:spPr/>
+        <p:txBody>
+          <a:bodyPr/>
+          <a:lstStyle/>
+          <a:p>
+            <a:fld id="{7A7A0B3B-8EF1-43DB-9A05-9913B3E55C42}" type="datetime1">
+              <a:rPr lang="de-DE" noProof="0" smtClean="0"/>
+              <a:t>05.07.2020</a:t>
+            </a:fld>
+            <a:endParaRPr lang="de-DE" noProof="0" dirty="0"/>
+          </a:p>
+        </p:txBody>
+      </p:sp>
+    </p:spTree>
+    <p:extLst>
+      <p:ext uri="{BB962C8B-B14F-4D97-AF65-F5344CB8AC3E}">
+        <p14:creationId xmlns:p14="http://schemas.microsoft.com/office/powerpoint/2010/main" val="2969827971"/>
+      </p:ext>
+    </p:extLst>
+  </p:cSld>
+  <p:clrMapOvr>
+    <a:masterClrMapping/>
+  </p:clrMapOvr>
+</p:sld>
+</file>
+
+<file path=ppt/slides/slide11.xml><?xml version="1.0" encoding="utf-8"?>
+<p:sld xmlns:a="http://schemas.openxmlformats.org/drawingml/2006/main" xmlns:r="http://schemas.openxmlformats.org/officeDocument/2006/relationships" xmlns:p="http://schemas.openxmlformats.org/presentationml/2006/main">
+  <p:cSld>
+    <p:spTree>
+      <p:nvGrpSpPr>
+        <p:cNvPr id="1" name=""/>
+        <p:cNvGrpSpPr/>
+        <p:nvPr/>
+      </p:nvGrpSpPr>
+      <p:grpSpPr>
+        <a:xfrm>
+          <a:off x="0" y="0"/>
+          <a:ext cx="0" cy="0"/>
+          <a:chOff x="0" y="0"/>
+          <a:chExt cx="0" cy="0"/>
+        </a:xfrm>
+      </p:grpSpPr>
+      <p:sp>
+        <p:nvSpPr>
+          <p:cNvPr id="2" name="Titel 1">
+            <a:extLst>
+              <a:ext uri="{FF2B5EF4-FFF2-40B4-BE49-F238E27FC236}">
+                <a16:creationId xmlns:a16="http://schemas.microsoft.com/office/drawing/2014/main" id="{D0FF129B-8A0F-4489-A8CC-56B95C55E854}"/>
+              </a:ext>
+            </a:extLst>
+          </p:cNvPr>
+          <p:cNvSpPr>
+            <a:spLocks noGrp="1"/>
+          </p:cNvSpPr>
+          <p:nvPr>
+            <p:ph type="title"/>
+          </p:nvPr>
+        </p:nvSpPr>
+        <p:spPr>
+          <a:xfrm>
+            <a:off x="3456992" y="3140968"/>
+            <a:ext cx="2230016" cy="576064"/>
+          </a:xfrm>
+        </p:spPr>
+        <p:txBody>
+          <a:bodyPr/>
+          <a:lstStyle/>
+          <a:p>
+            <a:r>
+              <a:rPr lang="de-DE" dirty="0"/>
+              <a:t>Lösung</a:t>
+            </a:r>
+          </a:p>
+        </p:txBody>
+      </p:sp>
+      <p:sp>
+        <p:nvSpPr>
+          <p:cNvPr id="4" name="Fußzeilenplatzhalter 3">
+            <a:extLst>
+              <a:ext uri="{FF2B5EF4-FFF2-40B4-BE49-F238E27FC236}">
+                <a16:creationId xmlns:a16="http://schemas.microsoft.com/office/drawing/2014/main" id="{814DA7EF-DAA6-43B3-A55D-57BEB841CC00}"/>
+              </a:ext>
+            </a:extLst>
+          </p:cNvPr>
+          <p:cNvSpPr>
+            <a:spLocks noGrp="1"/>
+          </p:cNvSpPr>
+          <p:nvPr>
+            <p:ph type="ftr" sz="quarter" idx="10"/>
+          </p:nvPr>
+        </p:nvSpPr>
+        <p:spPr/>
+        <p:txBody>
+          <a:bodyPr/>
+          <a:lstStyle/>
+          <a:p>
+            <a:r>
+              <a:rPr lang="de-DE" altLang="de-DE" noProof="0"/>
+              <a:t>Stefan Krieg - Segregated Witness</a:t>
+            </a:r>
+            <a:endParaRPr lang="de-DE" altLang="de-DE" noProof="0" dirty="0"/>
+          </a:p>
+        </p:txBody>
+      </p:sp>
+      <p:sp>
+        <p:nvSpPr>
+          <p:cNvPr id="5" name="Datumsplatzhalter 4">
+            <a:extLst>
+              <a:ext uri="{FF2B5EF4-FFF2-40B4-BE49-F238E27FC236}">
+                <a16:creationId xmlns:a16="http://schemas.microsoft.com/office/drawing/2014/main" id="{85B00BD5-D678-46ED-A5C0-0E1C6B532D6C}"/>
+              </a:ext>
+            </a:extLst>
+          </p:cNvPr>
+          <p:cNvSpPr>
+            <a:spLocks noGrp="1"/>
+          </p:cNvSpPr>
+          <p:nvPr>
+            <p:ph type="dt" sz="half" idx="2"/>
+          </p:nvPr>
+        </p:nvSpPr>
+        <p:spPr/>
+        <p:txBody>
+          <a:bodyPr/>
+          <a:lstStyle/>
+          <a:p>
+            <a:fld id="{2264CB09-F063-447F-A5D5-08DBE24D7A02}" type="datetime1">
+              <a:rPr lang="de-DE" noProof="0" smtClean="0"/>
+              <a:t>06.07.2020</a:t>
+            </a:fld>
+            <a:endParaRPr lang="de-DE" noProof="0" dirty="0"/>
+          </a:p>
+        </p:txBody>
+      </p:sp>
+    </p:spTree>
+    <p:extLst>
+      <p:ext uri="{BB962C8B-B14F-4D97-AF65-F5344CB8AC3E}">
+        <p14:creationId xmlns:p14="http://schemas.microsoft.com/office/powerpoint/2010/main" val="1811422202"/>
+      </p:ext>
+    </p:extLst>
+  </p:cSld>
+  <p:clrMapOvr>
+    <a:masterClrMapping/>
+  </p:clrMapOvr>
+</p:sld>
+</file>
+
+<file path=ppt/slides/slide12.xml><?xml version="1.0" encoding="utf-8"?>
+<p:sld xmlns:a="http://schemas.openxmlformats.org/drawingml/2006/main" xmlns:r="http://schemas.openxmlformats.org/officeDocument/2006/relationships" xmlns:p="http://schemas.openxmlformats.org/presentationml/2006/main">
+  <p:cSld>
+    <p:spTree>
+      <p:nvGrpSpPr>
+        <p:cNvPr id="1" name=""/>
+        <p:cNvGrpSpPr/>
+        <p:nvPr/>
+      </p:nvGrpSpPr>
+      <p:grpSpPr>
+        <a:xfrm>
+          <a:off x="0" y="0"/>
+          <a:ext cx="0" cy="0"/>
+          <a:chOff x="0" y="0"/>
+          <a:chExt cx="0" cy="0"/>
+        </a:xfrm>
+      </p:grpSpPr>
+      <p:sp>
+        <p:nvSpPr>
+          <p:cNvPr id="2" name="Titel 1"/>
+          <p:cNvSpPr>
+            <a:spLocks noGrp="1"/>
+          </p:cNvSpPr>
+          <p:nvPr>
+            <p:ph type="title"/>
+          </p:nvPr>
+        </p:nvSpPr>
+        <p:spPr/>
+        <p:txBody>
+          <a:bodyPr/>
+          <a:lstStyle/>
+          <a:p>
+            <a:r>
+              <a:rPr lang="de-DE" dirty="0"/>
+              <a:t>Konzept zur Behebung</a:t>
+            </a:r>
+          </a:p>
+        </p:txBody>
+      </p:sp>
+      <p:sp>
+        <p:nvSpPr>
+          <p:cNvPr id="3" name="Inhaltsplatzhalter 2"/>
+          <p:cNvSpPr>
+            <a:spLocks noGrp="1"/>
+          </p:cNvSpPr>
+          <p:nvPr>
+            <p:ph idx="1"/>
+          </p:nvPr>
+        </p:nvSpPr>
+        <p:spPr/>
+        <p:txBody>
+          <a:bodyPr/>
+          <a:lstStyle/>
+          <a:p>
+            <a:r>
+              <a:rPr lang="de-DE" dirty="0"/>
+              <a:t>Neue Struktur namens „</a:t>
+            </a:r>
+            <a:r>
+              <a:rPr lang="de-DE" dirty="0" err="1"/>
+              <a:t>witness</a:t>
+            </a:r>
+            <a:r>
+              <a:rPr lang="de-DE" dirty="0"/>
+              <a:t>“</a:t>
+            </a:r>
+          </a:p>
+        </p:txBody>
+      </p:sp>
+      <p:sp>
+        <p:nvSpPr>
+          <p:cNvPr id="4" name="Fußzeilenplatzhalter 3"/>
+          <p:cNvSpPr>
+            <a:spLocks noGrp="1"/>
+          </p:cNvSpPr>
+          <p:nvPr>
+            <p:ph type="ftr" sz="quarter" idx="10"/>
+          </p:nvPr>
+        </p:nvSpPr>
+        <p:spPr/>
+        <p:txBody>
+          <a:bodyPr/>
+          <a:lstStyle/>
+          <a:p>
+            <a:r>
+              <a:rPr lang="de-DE" altLang="de-DE" noProof="0"/>
+              <a:t>Stefan Krieg - Segregated Witness</a:t>
+            </a:r>
+            <a:endParaRPr lang="de-DE" altLang="de-DE" noProof="0" dirty="0"/>
+          </a:p>
+        </p:txBody>
+      </p:sp>
+      <p:sp>
+        <p:nvSpPr>
+          <p:cNvPr id="5" name="Datumsplatzhalter 4"/>
+          <p:cNvSpPr>
+            <a:spLocks noGrp="1"/>
+          </p:cNvSpPr>
+          <p:nvPr>
+            <p:ph type="dt" sz="half" idx="2"/>
+          </p:nvPr>
+        </p:nvSpPr>
+        <p:spPr/>
+        <p:txBody>
+          <a:bodyPr/>
+          <a:lstStyle/>
+          <a:p>
+            <a:fld id="{803FB609-5AD3-47A6-B773-3670A2D8EF69}" type="datetime1">
+              <a:rPr lang="de-DE" noProof="0" smtClean="0"/>
+              <a:t>05.07.2020</a:t>
+            </a:fld>
+            <a:endParaRPr lang="de-DE" noProof="0" dirty="0"/>
+          </a:p>
+        </p:txBody>
+      </p:sp>
+      <p:pic>
+        <p:nvPicPr>
+          <p:cNvPr id="8" name="Grafik 7">
+            <a:extLst>
+              <a:ext uri="{FF2B5EF4-FFF2-40B4-BE49-F238E27FC236}">
+                <a16:creationId xmlns:a16="http://schemas.microsoft.com/office/drawing/2014/main" id="{E881F535-147B-46C5-9A06-D1BE424CB53F}"/>
+              </a:ext>
+            </a:extLst>
+          </p:cNvPr>
+          <p:cNvPicPr>
+            <a:picLocks noChangeAspect="1"/>
+          </p:cNvPicPr>
+          <p:nvPr/>
+        </p:nvPicPr>
+        <p:blipFill>
+          <a:blip r:embed="rId2">
+            <a:extLst>
+              <a:ext uri="{28A0092B-C50C-407E-A947-70E740481C1C}">
+                <a14:useLocalDpi xmlns:a14="http://schemas.microsoft.com/office/drawing/2010/main" val="0"/>
+              </a:ext>
+            </a:extLst>
+          </a:blip>
+          <a:stretch>
+            <a:fillRect/>
+          </a:stretch>
+        </p:blipFill>
+        <p:spPr>
+          <a:xfrm>
+            <a:off x="392113" y="1912758"/>
+            <a:ext cx="8356600" cy="3465871"/>
+          </a:xfrm>
+          <a:prstGeom prst="rect">
+            <a:avLst/>
+          </a:prstGeom>
+        </p:spPr>
+      </p:pic>
+      <p:sp>
+        <p:nvSpPr>
+          <p:cNvPr id="10" name="Textfeld 9">
+            <a:extLst>
+              <a:ext uri="{FF2B5EF4-FFF2-40B4-BE49-F238E27FC236}">
+                <a16:creationId xmlns:a16="http://schemas.microsoft.com/office/drawing/2014/main" id="{605CB3E3-9EFC-4F19-BCCA-E81ABDB3BDAD}"/>
+              </a:ext>
+            </a:extLst>
+          </p:cNvPr>
+          <p:cNvSpPr txBox="1"/>
+          <p:nvPr/>
+        </p:nvSpPr>
+        <p:spPr>
+          <a:xfrm>
+            <a:off x="2090290" y="5731054"/>
+            <a:ext cx="4960245" cy="246221"/>
+          </a:xfrm>
+          <a:prstGeom prst="rect">
+            <a:avLst/>
+          </a:prstGeom>
+          <a:noFill/>
+        </p:spPr>
+        <p:txBody>
+          <a:bodyPr wrap="square" rtlCol="0">
+            <a:spAutoFit/>
+          </a:bodyPr>
+          <a:lstStyle/>
+          <a:p>
+            <a:r>
+              <a:rPr lang="de-DE" sz="1000" dirty="0"/>
+              <a:t>Bildquelle: https://www.buybitcoinworldwide.com/pages/info/img/segwit-v-legacy.png</a:t>
+            </a:r>
+          </a:p>
+        </p:txBody>
+      </p:sp>
+    </p:spTree>
+    <p:extLst>
+      <p:ext uri="{BB962C8B-B14F-4D97-AF65-F5344CB8AC3E}">
+        <p14:creationId xmlns:p14="http://schemas.microsoft.com/office/powerpoint/2010/main" val="2750674219"/>
+      </p:ext>
+    </p:extLst>
+  </p:cSld>
+  <p:clrMapOvr>
+    <a:masterClrMapping/>
+  </p:clrMapOvr>
+</p:sld>
+</file>
+
+<file path=ppt/slides/slide13.xml><?xml version="1.0" encoding="utf-8"?>
+<p:sld xmlns:a="http://schemas.openxmlformats.org/drawingml/2006/main" xmlns:r="http://schemas.openxmlformats.org/officeDocument/2006/relationships" xmlns:p="http://schemas.openxmlformats.org/presentationml/2006/main">
+  <p:cSld>
+    <p:spTree>
+      <p:nvGrpSpPr>
+        <p:cNvPr id="1" name=""/>
+        <p:cNvGrpSpPr/>
+        <p:nvPr/>
+      </p:nvGrpSpPr>
+      <p:grpSpPr>
+        <a:xfrm>
+          <a:off x="0" y="0"/>
+          <a:ext cx="0" cy="0"/>
+          <a:chOff x="0" y="0"/>
+          <a:chExt cx="0" cy="0"/>
+        </a:xfrm>
+      </p:grpSpPr>
+      <p:sp>
+        <p:nvSpPr>
+          <p:cNvPr id="2" name="Titel 1">
+            <a:extLst>
+              <a:ext uri="{FF2B5EF4-FFF2-40B4-BE49-F238E27FC236}">
+                <a16:creationId xmlns:a16="http://schemas.microsoft.com/office/drawing/2014/main" id="{4BBF7614-FE10-4C4B-8552-341429CA36E0}"/>
+              </a:ext>
+            </a:extLst>
+          </p:cNvPr>
+          <p:cNvSpPr>
+            <a:spLocks noGrp="1"/>
+          </p:cNvSpPr>
+          <p:nvPr>
+            <p:ph type="title"/>
+          </p:nvPr>
+        </p:nvSpPr>
+        <p:spPr/>
+        <p:txBody>
+          <a:bodyPr/>
+          <a:lstStyle/>
+          <a:p>
+            <a:r>
+              <a:rPr lang="de-DE" dirty="0"/>
+              <a:t>Umsetzung</a:t>
+            </a:r>
+          </a:p>
+        </p:txBody>
+      </p:sp>
+      <p:sp>
+        <p:nvSpPr>
+          <p:cNvPr id="3" name="Inhaltsplatzhalter 2">
+            <a:extLst>
+              <a:ext uri="{FF2B5EF4-FFF2-40B4-BE49-F238E27FC236}">
+                <a16:creationId xmlns:a16="http://schemas.microsoft.com/office/drawing/2014/main" id="{51AC662C-35D7-4CBE-B2E9-2DA4A7303D1E}"/>
+              </a:ext>
+            </a:extLst>
+          </p:cNvPr>
+          <p:cNvSpPr>
+            <a:spLocks noGrp="1"/>
+          </p:cNvSpPr>
+          <p:nvPr>
+            <p:ph idx="1"/>
+          </p:nvPr>
+        </p:nvSpPr>
+        <p:spPr/>
+        <p:txBody>
+          <a:bodyPr/>
+          <a:lstStyle/>
+          <a:p>
+            <a:r>
+              <a:rPr lang="de-DE" dirty="0"/>
+              <a:t>2 IDs statt einer</a:t>
+            </a:r>
+          </a:p>
+          <a:p>
+            <a:pPr marL="0" indent="0">
+              <a:buNone/>
+            </a:pPr>
+            <a:endParaRPr lang="de-DE" dirty="0"/>
+          </a:p>
+          <a:p>
+            <a:r>
+              <a:rPr lang="de-DE" dirty="0"/>
+              <a:t>Berechnung </a:t>
+            </a:r>
+            <a:r>
+              <a:rPr lang="de-DE" dirty="0" err="1"/>
+              <a:t>TxID</a:t>
+            </a:r>
+            <a:r>
+              <a:rPr lang="de-DE" dirty="0"/>
+              <a:t> wie vorher</a:t>
+            </a:r>
+          </a:p>
+          <a:p>
+            <a:pPr marL="0" indent="0">
+              <a:buNone/>
+            </a:pPr>
+            <a:endParaRPr lang="de-DE" dirty="0"/>
+          </a:p>
+          <a:p>
+            <a:r>
+              <a:rPr lang="de-DE" dirty="0"/>
+              <a:t>Berechnung </a:t>
+            </a:r>
+            <a:r>
+              <a:rPr lang="de-DE" dirty="0" err="1"/>
+              <a:t>WTxID</a:t>
+            </a:r>
+            <a:r>
+              <a:rPr lang="de-DE" dirty="0"/>
+              <a:t> über serialisierte Daten</a:t>
+            </a:r>
+          </a:p>
+        </p:txBody>
+      </p:sp>
+      <p:sp>
+        <p:nvSpPr>
+          <p:cNvPr id="4" name="Fußzeilenplatzhalter 3">
+            <a:extLst>
+              <a:ext uri="{FF2B5EF4-FFF2-40B4-BE49-F238E27FC236}">
+                <a16:creationId xmlns:a16="http://schemas.microsoft.com/office/drawing/2014/main" id="{1737CB6D-2CD6-4B0F-98EB-68161A38EB54}"/>
+              </a:ext>
+            </a:extLst>
+          </p:cNvPr>
+          <p:cNvSpPr>
+            <a:spLocks noGrp="1"/>
+          </p:cNvSpPr>
+          <p:nvPr>
+            <p:ph type="ftr" sz="quarter" idx="10"/>
+          </p:nvPr>
+        </p:nvSpPr>
+        <p:spPr/>
+        <p:txBody>
+          <a:bodyPr/>
+          <a:lstStyle/>
+          <a:p>
+            <a:r>
+              <a:rPr lang="de-DE" altLang="de-DE" noProof="0"/>
+              <a:t>Stefan Krieg - Segregated Witness</a:t>
+            </a:r>
+            <a:endParaRPr lang="de-DE" altLang="de-DE" noProof="0" dirty="0"/>
+          </a:p>
+        </p:txBody>
+      </p:sp>
+      <p:sp>
+        <p:nvSpPr>
+          <p:cNvPr id="5" name="Datumsplatzhalter 4">
+            <a:extLst>
+              <a:ext uri="{FF2B5EF4-FFF2-40B4-BE49-F238E27FC236}">
+                <a16:creationId xmlns:a16="http://schemas.microsoft.com/office/drawing/2014/main" id="{884F9B4E-5EF4-401B-9933-3C446FD1ABE0}"/>
+              </a:ext>
+            </a:extLst>
+          </p:cNvPr>
+          <p:cNvSpPr>
+            <a:spLocks noGrp="1"/>
+          </p:cNvSpPr>
+          <p:nvPr>
+            <p:ph type="dt" sz="half" idx="2"/>
+          </p:nvPr>
+        </p:nvSpPr>
+        <p:spPr/>
+        <p:txBody>
+          <a:bodyPr/>
+          <a:lstStyle/>
+          <a:p>
+            <a:fld id="{7A7A0B3B-8EF1-43DB-9A05-9913B3E55C42}" type="datetime1">
+              <a:rPr lang="de-DE" noProof="0" smtClean="0"/>
+              <a:t>05.07.2020</a:t>
+            </a:fld>
+            <a:endParaRPr lang="de-DE" noProof="0" dirty="0"/>
+          </a:p>
+        </p:txBody>
+      </p:sp>
+      <p:pic>
+        <p:nvPicPr>
+          <p:cNvPr id="7" name="Grafik 6" descr="Ein Bild, das Screenshot, Monitor, Ball, haltend enthält.&#10;&#10;Automatisch generierte Beschreibung">
+            <a:extLst>
+              <a:ext uri="{FF2B5EF4-FFF2-40B4-BE49-F238E27FC236}">
+                <a16:creationId xmlns:a16="http://schemas.microsoft.com/office/drawing/2014/main" id="{60820D0E-CBAC-423F-BC9E-21C20F054601}"/>
+              </a:ext>
+            </a:extLst>
+          </p:cNvPr>
+          <p:cNvPicPr>
+            <a:picLocks noChangeAspect="1"/>
+          </p:cNvPicPr>
+          <p:nvPr/>
+        </p:nvPicPr>
+        <p:blipFill>
+          <a:blip r:embed="rId2">
+            <a:extLst>
+              <a:ext uri="{28A0092B-C50C-407E-A947-70E740481C1C}">
+                <a14:useLocalDpi xmlns:a14="http://schemas.microsoft.com/office/drawing/2010/main" val="0"/>
+              </a:ext>
+            </a:extLst>
+          </a:blip>
+          <a:stretch>
+            <a:fillRect/>
+          </a:stretch>
+        </p:blipFill>
+        <p:spPr>
+          <a:xfrm>
+            <a:off x="215105" y="4239948"/>
+            <a:ext cx="8710613" cy="1116276"/>
+          </a:xfrm>
+          <a:prstGeom prst="rect">
+            <a:avLst/>
+          </a:prstGeom>
+        </p:spPr>
+      </p:pic>
+      <p:sp>
+        <p:nvSpPr>
+          <p:cNvPr id="8" name="Textfeld 7">
+            <a:extLst>
+              <a:ext uri="{FF2B5EF4-FFF2-40B4-BE49-F238E27FC236}">
+                <a16:creationId xmlns:a16="http://schemas.microsoft.com/office/drawing/2014/main" id="{4865CE59-B70F-4C59-A49B-07A5A95E3EF4}"/>
+              </a:ext>
+            </a:extLst>
+          </p:cNvPr>
+          <p:cNvSpPr txBox="1"/>
+          <p:nvPr/>
+        </p:nvSpPr>
+        <p:spPr>
+          <a:xfrm>
+            <a:off x="1991227" y="5659437"/>
+            <a:ext cx="5158370" cy="246221"/>
+          </a:xfrm>
+          <a:prstGeom prst="rect">
+            <a:avLst/>
+          </a:prstGeom>
+          <a:noFill/>
+        </p:spPr>
+        <p:txBody>
+          <a:bodyPr wrap="square" rtlCol="0">
+            <a:spAutoFit/>
+          </a:bodyPr>
+          <a:lstStyle/>
+          <a:p>
+            <a:r>
+              <a:rPr lang="de-DE" sz="1000" dirty="0"/>
+              <a:t>Bildquelle: </a:t>
+            </a:r>
+            <a:r>
+              <a:rPr lang="de-DE" sz="1000" dirty="0">
+                <a:hlinkClick r:id="rId3"/>
+              </a:rPr>
+              <a:t>https://raw.githubusercontent.com/bitcoin/bips/master/bip-0144/witnesstx.png</a:t>
+            </a:r>
+            <a:endParaRPr lang="de-DE" sz="1000" dirty="0"/>
+          </a:p>
+        </p:txBody>
+      </p:sp>
+    </p:spTree>
+    <p:extLst>
+      <p:ext uri="{BB962C8B-B14F-4D97-AF65-F5344CB8AC3E}">
+        <p14:creationId xmlns:p14="http://schemas.microsoft.com/office/powerpoint/2010/main" val="373049310"/>
+      </p:ext>
+    </p:extLst>
+  </p:cSld>
+  <p:clrMapOvr>
+    <a:masterClrMapping/>
+  </p:clrMapOvr>
+</p:sld>
+</file>
+
+<file path=ppt/slides/slide14.xml><?xml version="1.0" encoding="utf-8"?>
+<p:sld xmlns:a="http://schemas.openxmlformats.org/drawingml/2006/main" xmlns:r="http://schemas.openxmlformats.org/officeDocument/2006/relationships" xmlns:p="http://schemas.openxmlformats.org/presentationml/2006/main">
+  <p:cSld>
+    <p:spTree>
+      <p:nvGrpSpPr>
+        <p:cNvPr id="1" name=""/>
+        <p:cNvGrpSpPr/>
+        <p:nvPr/>
+      </p:nvGrpSpPr>
+      <p:grpSpPr>
+        <a:xfrm>
+          <a:off x="0" y="0"/>
+          <a:ext cx="0" cy="0"/>
+          <a:chOff x="0" y="0"/>
+          <a:chExt cx="0" cy="0"/>
+        </a:xfrm>
+      </p:grpSpPr>
+      <p:sp>
+        <p:nvSpPr>
+          <p:cNvPr id="2" name="Titel 1">
+            <a:extLst>
+              <a:ext uri="{FF2B5EF4-FFF2-40B4-BE49-F238E27FC236}">
+                <a16:creationId xmlns:a16="http://schemas.microsoft.com/office/drawing/2014/main" id="{6ABD896A-7048-414E-8F80-A67CF6DB50B1}"/>
+              </a:ext>
+            </a:extLst>
+          </p:cNvPr>
+          <p:cNvSpPr>
+            <a:spLocks noGrp="1"/>
+          </p:cNvSpPr>
+          <p:nvPr>
+            <p:ph type="title"/>
+          </p:nvPr>
+        </p:nvSpPr>
+        <p:spPr/>
+        <p:txBody>
+          <a:bodyPr/>
+          <a:lstStyle/>
+          <a:p>
+            <a:r>
+              <a:rPr lang="de-DE" dirty="0"/>
+              <a:t>Block-Gewicht</a:t>
+            </a:r>
+          </a:p>
+        </p:txBody>
+      </p:sp>
+      <p:sp>
+        <p:nvSpPr>
+          <p:cNvPr id="3" name="Inhaltsplatzhalter 2">
+            <a:extLst>
+              <a:ext uri="{FF2B5EF4-FFF2-40B4-BE49-F238E27FC236}">
+                <a16:creationId xmlns:a16="http://schemas.microsoft.com/office/drawing/2014/main" id="{4C6F5DA6-AA2A-485B-A333-72BFD65BEF15}"/>
+              </a:ext>
+            </a:extLst>
+          </p:cNvPr>
+          <p:cNvSpPr>
+            <a:spLocks noGrp="1"/>
+          </p:cNvSpPr>
+          <p:nvPr>
+            <p:ph idx="1"/>
+          </p:nvPr>
+        </p:nvSpPr>
+        <p:spPr/>
+        <p:txBody>
+          <a:bodyPr/>
+          <a:lstStyle/>
+          <a:p>
+            <a:r>
+              <a:rPr lang="de-DE" dirty="0"/>
+              <a:t>Berechnung: 3 * Basis Größe + Gesamt Größe</a:t>
+            </a:r>
+          </a:p>
+          <a:p>
+            <a:pPr marL="0" indent="0">
+              <a:buNone/>
+            </a:pPr>
+            <a:endParaRPr lang="de-DE" dirty="0"/>
+          </a:p>
+          <a:p>
+            <a:r>
+              <a:rPr lang="de-DE" dirty="0"/>
+              <a:t>Regel: Block-Gewicht ≤ 4,000,000</a:t>
+            </a:r>
+          </a:p>
+        </p:txBody>
+      </p:sp>
+      <p:sp>
+        <p:nvSpPr>
+          <p:cNvPr id="4" name="Fußzeilenplatzhalter 3">
+            <a:extLst>
+              <a:ext uri="{FF2B5EF4-FFF2-40B4-BE49-F238E27FC236}">
+                <a16:creationId xmlns:a16="http://schemas.microsoft.com/office/drawing/2014/main" id="{21741E76-6469-4E4F-B559-D42C0F3D2053}"/>
+              </a:ext>
+            </a:extLst>
+          </p:cNvPr>
+          <p:cNvSpPr>
+            <a:spLocks noGrp="1"/>
+          </p:cNvSpPr>
+          <p:nvPr>
+            <p:ph type="ftr" sz="quarter" idx="10"/>
+          </p:nvPr>
+        </p:nvSpPr>
+        <p:spPr/>
+        <p:txBody>
+          <a:bodyPr/>
+          <a:lstStyle/>
+          <a:p>
+            <a:r>
+              <a:rPr lang="de-DE" altLang="de-DE" noProof="0"/>
+              <a:t>Stefan Krieg - Segregated Witness</a:t>
+            </a:r>
+            <a:endParaRPr lang="de-DE" altLang="de-DE" noProof="0" dirty="0"/>
+          </a:p>
+        </p:txBody>
+      </p:sp>
+      <p:sp>
+        <p:nvSpPr>
+          <p:cNvPr id="5" name="Datumsplatzhalter 4">
+            <a:extLst>
+              <a:ext uri="{FF2B5EF4-FFF2-40B4-BE49-F238E27FC236}">
+                <a16:creationId xmlns:a16="http://schemas.microsoft.com/office/drawing/2014/main" id="{047A9B19-5652-450A-A5F2-1D0984C8D0B1}"/>
+              </a:ext>
+            </a:extLst>
+          </p:cNvPr>
+          <p:cNvSpPr>
+            <a:spLocks noGrp="1"/>
+          </p:cNvSpPr>
+          <p:nvPr>
+            <p:ph type="dt" sz="half" idx="2"/>
+          </p:nvPr>
+        </p:nvSpPr>
+        <p:spPr/>
+        <p:txBody>
+          <a:bodyPr/>
+          <a:lstStyle/>
+          <a:p>
+            <a:fld id="{7A7A0B3B-8EF1-43DB-9A05-9913B3E55C42}" type="datetime1">
+              <a:rPr lang="de-DE" noProof="0" smtClean="0"/>
+              <a:t>05.07.2020</a:t>
+            </a:fld>
+            <a:endParaRPr lang="de-DE" noProof="0" dirty="0"/>
+          </a:p>
+        </p:txBody>
+      </p:sp>
+    </p:spTree>
+    <p:extLst>
+      <p:ext uri="{BB962C8B-B14F-4D97-AF65-F5344CB8AC3E}">
+        <p14:creationId xmlns:p14="http://schemas.microsoft.com/office/powerpoint/2010/main" val="3110725254"/>
+      </p:ext>
+    </p:extLst>
+  </p:cSld>
+  <p:clrMapOvr>
+    <a:masterClrMapping/>
+  </p:clrMapOvr>
+</p:sld>
+</file>
+
+<file path=ppt/slides/slide15.xml><?xml version="1.0" encoding="utf-8"?>
+<p:sld xmlns:a="http://schemas.openxmlformats.org/drawingml/2006/main" xmlns:r="http://schemas.openxmlformats.org/officeDocument/2006/relationships" xmlns:p="http://schemas.openxmlformats.org/presentationml/2006/main">
+  <p:cSld>
+    <p:spTree>
+      <p:nvGrpSpPr>
+        <p:cNvPr id="1" name=""/>
+        <p:cNvGrpSpPr/>
+        <p:nvPr/>
+      </p:nvGrpSpPr>
+      <p:grpSpPr>
+        <a:xfrm>
+          <a:off x="0" y="0"/>
+          <a:ext cx="0" cy="0"/>
+          <a:chOff x="0" y="0"/>
+          <a:chExt cx="0" cy="0"/>
+        </a:xfrm>
+      </p:grpSpPr>
+      <p:sp>
+        <p:nvSpPr>
+          <p:cNvPr id="2" name="Titel 1">
+            <a:extLst>
+              <a:ext uri="{FF2B5EF4-FFF2-40B4-BE49-F238E27FC236}">
+                <a16:creationId xmlns:a16="http://schemas.microsoft.com/office/drawing/2014/main" id="{D33D788B-EF17-48CC-B245-E5521D9C5F1A}"/>
+              </a:ext>
+            </a:extLst>
+          </p:cNvPr>
+          <p:cNvSpPr>
+            <a:spLocks noGrp="1"/>
+          </p:cNvSpPr>
+          <p:nvPr>
+            <p:ph type="title"/>
+          </p:nvPr>
+        </p:nvSpPr>
+        <p:spPr/>
+        <p:txBody>
+          <a:bodyPr/>
+          <a:lstStyle/>
+          <a:p>
+            <a:r>
+              <a:rPr lang="de-DE" dirty="0" err="1"/>
+              <a:t>Witness</a:t>
+            </a:r>
+            <a:r>
+              <a:rPr lang="de-DE" dirty="0"/>
+              <a:t> Merkle </a:t>
+            </a:r>
+            <a:r>
+              <a:rPr lang="de-DE" dirty="0" err="1"/>
+              <a:t>Tree</a:t>
+            </a:r>
+            <a:endParaRPr lang="de-DE" dirty="0"/>
+          </a:p>
+        </p:txBody>
+      </p:sp>
+      <p:sp>
+        <p:nvSpPr>
+          <p:cNvPr id="3" name="Inhaltsplatzhalter 2">
+            <a:extLst>
+              <a:ext uri="{FF2B5EF4-FFF2-40B4-BE49-F238E27FC236}">
+                <a16:creationId xmlns:a16="http://schemas.microsoft.com/office/drawing/2014/main" id="{2D9065F7-FF4E-4AE0-BB0A-E30EEEFA2369}"/>
+              </a:ext>
+            </a:extLst>
+          </p:cNvPr>
+          <p:cNvSpPr>
+            <a:spLocks noGrp="1"/>
+          </p:cNvSpPr>
+          <p:nvPr>
+            <p:ph idx="1"/>
+          </p:nvPr>
+        </p:nvSpPr>
+        <p:spPr/>
+        <p:txBody>
+          <a:bodyPr/>
+          <a:lstStyle/>
+          <a:p>
+            <a:r>
+              <a:rPr lang="de-DE" dirty="0"/>
+              <a:t>Gleich wie normaler Merkle </a:t>
+            </a:r>
+            <a:r>
+              <a:rPr lang="de-DE" dirty="0" err="1"/>
+              <a:t>Tree</a:t>
+            </a:r>
+            <a:r>
+              <a:rPr lang="de-DE" dirty="0"/>
+              <a:t> aber für </a:t>
+            </a:r>
+            <a:r>
+              <a:rPr lang="de-DE" dirty="0" err="1"/>
+              <a:t>Witness</a:t>
+            </a:r>
+            <a:endParaRPr lang="de-DE" dirty="0"/>
+          </a:p>
+          <a:p>
+            <a:r>
+              <a:rPr lang="de-DE" dirty="0" err="1"/>
+              <a:t>Witness</a:t>
+            </a:r>
+            <a:r>
+              <a:rPr lang="de-DE" dirty="0"/>
+              <a:t> Root Hash in </a:t>
+            </a:r>
+            <a:r>
+              <a:rPr lang="de-DE" dirty="0" err="1"/>
+              <a:t>coinbase</a:t>
+            </a:r>
+            <a:r>
+              <a:rPr lang="de-DE" dirty="0"/>
+              <a:t> Transaktion</a:t>
+            </a:r>
+          </a:p>
+        </p:txBody>
+      </p:sp>
+      <p:sp>
+        <p:nvSpPr>
+          <p:cNvPr id="4" name="Fußzeilenplatzhalter 3">
+            <a:extLst>
+              <a:ext uri="{FF2B5EF4-FFF2-40B4-BE49-F238E27FC236}">
+                <a16:creationId xmlns:a16="http://schemas.microsoft.com/office/drawing/2014/main" id="{66031DAA-0D37-4AE0-B8F3-5A22DD83831E}"/>
+              </a:ext>
+            </a:extLst>
+          </p:cNvPr>
+          <p:cNvSpPr>
+            <a:spLocks noGrp="1"/>
+          </p:cNvSpPr>
+          <p:nvPr>
+            <p:ph type="ftr" sz="quarter" idx="10"/>
+          </p:nvPr>
+        </p:nvSpPr>
+        <p:spPr/>
+        <p:txBody>
+          <a:bodyPr/>
+          <a:lstStyle/>
+          <a:p>
+            <a:r>
+              <a:rPr lang="de-DE" altLang="de-DE" noProof="0"/>
+              <a:t>Stefan Krieg - Segregated Witness</a:t>
+            </a:r>
+            <a:endParaRPr lang="de-DE" altLang="de-DE" noProof="0" dirty="0"/>
+          </a:p>
+        </p:txBody>
+      </p:sp>
+      <p:sp>
+        <p:nvSpPr>
+          <p:cNvPr id="5" name="Datumsplatzhalter 4">
+            <a:extLst>
+              <a:ext uri="{FF2B5EF4-FFF2-40B4-BE49-F238E27FC236}">
+                <a16:creationId xmlns:a16="http://schemas.microsoft.com/office/drawing/2014/main" id="{D9BD109E-7792-42EB-B2B8-C1CEF212204A}"/>
+              </a:ext>
+            </a:extLst>
+          </p:cNvPr>
+          <p:cNvSpPr>
+            <a:spLocks noGrp="1"/>
+          </p:cNvSpPr>
+          <p:nvPr>
+            <p:ph type="dt" sz="half" idx="2"/>
+          </p:nvPr>
+        </p:nvSpPr>
+        <p:spPr/>
+        <p:txBody>
+          <a:bodyPr/>
+          <a:lstStyle/>
+          <a:p>
+            <a:fld id="{7A7A0B3B-8EF1-43DB-9A05-9913B3E55C42}" type="datetime1">
+              <a:rPr lang="de-DE" noProof="0" smtClean="0"/>
+              <a:t>06.07.2020</a:t>
+            </a:fld>
+            <a:endParaRPr lang="de-DE" noProof="0" dirty="0"/>
+          </a:p>
+        </p:txBody>
+      </p:sp>
+      <p:pic>
+        <p:nvPicPr>
+          <p:cNvPr id="11" name="Grafik 10" descr="Ein Bild, das Screenshot, Anzeige enthält.&#10;&#10;Automatisch generierte Beschreibung">
+            <a:extLst>
+              <a:ext uri="{FF2B5EF4-FFF2-40B4-BE49-F238E27FC236}">
+                <a16:creationId xmlns:a16="http://schemas.microsoft.com/office/drawing/2014/main" id="{576F7B09-7FCE-48B1-8022-CF7076FD067E}"/>
+              </a:ext>
+            </a:extLst>
+          </p:cNvPr>
+          <p:cNvPicPr>
+            <a:picLocks noChangeAspect="1"/>
+          </p:cNvPicPr>
+          <p:nvPr/>
+        </p:nvPicPr>
+        <p:blipFill>
+          <a:blip r:embed="rId2">
+            <a:extLst>
+              <a:ext uri="{28A0092B-C50C-407E-A947-70E740481C1C}">
+                <a14:useLocalDpi xmlns:a14="http://schemas.microsoft.com/office/drawing/2010/main" val="0"/>
+              </a:ext>
+            </a:extLst>
+          </a:blip>
+          <a:stretch>
+            <a:fillRect/>
+          </a:stretch>
+        </p:blipFill>
+        <p:spPr>
+          <a:xfrm>
+            <a:off x="126299" y="2377702"/>
+            <a:ext cx="8891401" cy="3281735"/>
+          </a:xfrm>
+          <a:prstGeom prst="rect">
+            <a:avLst/>
+          </a:prstGeom>
+        </p:spPr>
+      </p:pic>
+      <p:sp>
+        <p:nvSpPr>
+          <p:cNvPr id="12" name="Textfeld 11">
+            <a:extLst>
+              <a:ext uri="{FF2B5EF4-FFF2-40B4-BE49-F238E27FC236}">
+                <a16:creationId xmlns:a16="http://schemas.microsoft.com/office/drawing/2014/main" id="{4FB32BB3-8779-4366-8894-47531F66D8E5}"/>
+              </a:ext>
+            </a:extLst>
+          </p:cNvPr>
+          <p:cNvSpPr txBox="1"/>
+          <p:nvPr/>
+        </p:nvSpPr>
+        <p:spPr>
+          <a:xfrm>
+            <a:off x="1651583" y="5969714"/>
+            <a:ext cx="5837659" cy="246221"/>
+          </a:xfrm>
+          <a:prstGeom prst="rect">
+            <a:avLst/>
+          </a:prstGeom>
+          <a:noFill/>
+        </p:spPr>
+        <p:txBody>
+          <a:bodyPr wrap="square" rtlCol="0">
+            <a:spAutoFit/>
+          </a:bodyPr>
+          <a:lstStyle/>
+          <a:p>
+            <a:r>
+              <a:rPr lang="de-DE" sz="1000" dirty="0"/>
+              <a:t>Bildquelle: </a:t>
+            </a:r>
+            <a:r>
+              <a:rPr lang="de-DE" sz="1000" dirty="0">
+                <a:hlinkClick r:id="rId3"/>
+              </a:rPr>
+              <a:t>https://blockchain-nachrichten.com/uploads/8/2/2/6/82265992/segwit-merkle-tree_orig.png</a:t>
+            </a:r>
+            <a:endParaRPr lang="de-DE" sz="1000" dirty="0"/>
+          </a:p>
+        </p:txBody>
+      </p:sp>
+    </p:spTree>
+    <p:extLst>
+      <p:ext uri="{BB962C8B-B14F-4D97-AF65-F5344CB8AC3E}">
+        <p14:creationId xmlns:p14="http://schemas.microsoft.com/office/powerpoint/2010/main" val="3335908798"/>
+      </p:ext>
+    </p:extLst>
+  </p:cSld>
+  <p:clrMapOvr>
+    <a:masterClrMapping/>
+  </p:clrMapOvr>
+</p:sld>
+</file>
+
+<file path=ppt/slides/slide16.xml><?xml version="1.0" encoding="utf-8"?>
+<p:sld xmlns:a="http://schemas.openxmlformats.org/drawingml/2006/main" xmlns:r="http://schemas.openxmlformats.org/officeDocument/2006/relationships" xmlns:p="http://schemas.openxmlformats.org/presentationml/2006/main">
+  <p:cSld>
+    <p:spTree>
+      <p:nvGrpSpPr>
+        <p:cNvPr id="1" name=""/>
+        <p:cNvGrpSpPr/>
+        <p:nvPr/>
+      </p:nvGrpSpPr>
+      <p:grpSpPr>
+        <a:xfrm>
+          <a:off x="0" y="0"/>
+          <a:ext cx="0" cy="0"/>
+          <a:chOff x="0" y="0"/>
+          <a:chExt cx="0" cy="0"/>
+        </a:xfrm>
+      </p:grpSpPr>
+      <p:sp>
+        <p:nvSpPr>
+          <p:cNvPr id="2" name="Titel 1"/>
+          <p:cNvSpPr>
+            <a:spLocks noGrp="1"/>
+          </p:cNvSpPr>
+          <p:nvPr>
+            <p:ph type="title"/>
+          </p:nvPr>
+        </p:nvSpPr>
+        <p:spPr/>
+        <p:txBody>
+          <a:bodyPr/>
+          <a:lstStyle/>
+          <a:p>
+            <a:r>
+              <a:rPr lang="de-DE" dirty="0"/>
+              <a:t>Soft Fork</a:t>
+            </a:r>
+          </a:p>
+        </p:txBody>
+      </p:sp>
+      <p:sp>
+        <p:nvSpPr>
+          <p:cNvPr id="3" name="Inhaltsplatzhalter 2"/>
+          <p:cNvSpPr>
+            <a:spLocks noGrp="1"/>
+          </p:cNvSpPr>
+          <p:nvPr>
+            <p:ph idx="1"/>
+          </p:nvPr>
+        </p:nvSpPr>
+        <p:spPr/>
+        <p:txBody>
+          <a:bodyPr/>
+          <a:lstStyle/>
+          <a:p>
+            <a:r>
+              <a:rPr lang="de-DE" dirty="0"/>
+              <a:t>Rückwärts kompatibel</a:t>
+            </a:r>
+          </a:p>
+          <a:p>
+            <a:pPr marL="0" indent="0">
+              <a:buNone/>
+            </a:pPr>
+            <a:endParaRPr lang="de-DE" dirty="0"/>
+          </a:p>
+          <a:p>
+            <a:r>
+              <a:rPr lang="de-DE" dirty="0"/>
+              <a:t>Alte </a:t>
+            </a:r>
+            <a:r>
+              <a:rPr lang="de-DE" dirty="0" err="1"/>
+              <a:t>Wallets</a:t>
+            </a:r>
+            <a:r>
+              <a:rPr lang="de-DE" dirty="0"/>
+              <a:t> können nicht:</a:t>
+            </a:r>
+          </a:p>
+          <a:p>
+            <a:pPr lvl="1"/>
+            <a:r>
+              <a:rPr lang="de-DE" dirty="0" err="1"/>
+              <a:t>SegWit</a:t>
+            </a:r>
+            <a:r>
+              <a:rPr lang="de-DE" dirty="0"/>
+              <a:t> Transaktionen validieren</a:t>
+            </a:r>
+          </a:p>
+          <a:p>
+            <a:pPr marL="476250" lvl="1" indent="0">
+              <a:buNone/>
+            </a:pPr>
+            <a:endParaRPr lang="de-DE" dirty="0"/>
+          </a:p>
+          <a:p>
+            <a:r>
+              <a:rPr lang="de-DE" dirty="0"/>
+              <a:t>Wurde am 24. August 2017 aktiviert</a:t>
+            </a:r>
+          </a:p>
+        </p:txBody>
+      </p:sp>
+      <p:sp>
+        <p:nvSpPr>
+          <p:cNvPr id="4" name="Fußzeilenplatzhalter 3"/>
+          <p:cNvSpPr>
+            <a:spLocks noGrp="1"/>
+          </p:cNvSpPr>
+          <p:nvPr>
+            <p:ph type="ftr" sz="quarter" idx="10"/>
+          </p:nvPr>
+        </p:nvSpPr>
+        <p:spPr/>
+        <p:txBody>
+          <a:bodyPr/>
+          <a:lstStyle/>
+          <a:p>
+            <a:r>
+              <a:rPr lang="de-DE" altLang="de-DE" noProof="0"/>
+              <a:t>Stefan Krieg - Segregated Witness</a:t>
+            </a:r>
+            <a:endParaRPr lang="de-DE" altLang="de-DE" noProof="0" dirty="0"/>
+          </a:p>
+        </p:txBody>
+      </p:sp>
+      <p:sp>
+        <p:nvSpPr>
+          <p:cNvPr id="5" name="Datumsplatzhalter 4"/>
+          <p:cNvSpPr>
+            <a:spLocks noGrp="1"/>
+          </p:cNvSpPr>
+          <p:nvPr>
+            <p:ph type="dt" sz="half" idx="2"/>
+          </p:nvPr>
+        </p:nvSpPr>
+        <p:spPr/>
+        <p:txBody>
+          <a:bodyPr/>
+          <a:lstStyle/>
+          <a:p>
+            <a:fld id="{78C46995-B035-486A-8684-0AE660797F9B}" type="datetime1">
+              <a:rPr lang="de-DE" noProof="0" smtClean="0"/>
+              <a:t>05.07.2020</a:t>
+            </a:fld>
+            <a:endParaRPr lang="de-DE" noProof="0" dirty="0"/>
+          </a:p>
+        </p:txBody>
+      </p:sp>
+    </p:spTree>
+    <p:extLst>
+      <p:ext uri="{BB962C8B-B14F-4D97-AF65-F5344CB8AC3E}">
+        <p14:creationId xmlns:p14="http://schemas.microsoft.com/office/powerpoint/2010/main" val="707652004"/>
+      </p:ext>
+    </p:extLst>
+  </p:cSld>
+  <p:clrMapOvr>
+    <a:masterClrMapping/>
+  </p:clrMapOvr>
+</p:sld>
+</file>
+
+<file path=ppt/slides/slide17.xml><?xml version="1.0" encoding="utf-8"?>
+<p:sld xmlns:a="http://schemas.openxmlformats.org/drawingml/2006/main" xmlns:r="http://schemas.openxmlformats.org/officeDocument/2006/relationships" xmlns:p="http://schemas.openxmlformats.org/presentationml/2006/main">
+  <p:cSld>
+    <p:spTree>
+      <p:nvGrpSpPr>
+        <p:cNvPr id="1" name=""/>
+        <p:cNvGrpSpPr/>
+        <p:nvPr/>
+      </p:nvGrpSpPr>
+      <p:grpSpPr>
+        <a:xfrm>
+          <a:off x="0" y="0"/>
+          <a:ext cx="0" cy="0"/>
+          <a:chOff x="0" y="0"/>
+          <a:chExt cx="0" cy="0"/>
+        </a:xfrm>
+      </p:grpSpPr>
+      <p:sp>
+        <p:nvSpPr>
+          <p:cNvPr id="2" name="Titel 1"/>
+          <p:cNvSpPr>
+            <a:spLocks noGrp="1"/>
+          </p:cNvSpPr>
+          <p:nvPr>
+            <p:ph type="title"/>
+          </p:nvPr>
+        </p:nvSpPr>
+        <p:spPr/>
+        <p:txBody>
+          <a:bodyPr/>
+          <a:lstStyle/>
+          <a:p>
+            <a:r>
+              <a:rPr lang="de-DE" dirty="0"/>
+              <a:t>Evaluierung</a:t>
+            </a:r>
+          </a:p>
+        </p:txBody>
+      </p:sp>
+      <p:sp>
+        <p:nvSpPr>
+          <p:cNvPr id="3" name="Inhaltsplatzhalter 2"/>
+          <p:cNvSpPr>
+            <a:spLocks noGrp="1"/>
+          </p:cNvSpPr>
+          <p:nvPr>
+            <p:ph idx="1"/>
+          </p:nvPr>
+        </p:nvSpPr>
+        <p:spPr/>
+        <p:txBody>
+          <a:bodyPr/>
+          <a:lstStyle/>
+          <a:p>
+            <a:r>
+              <a:rPr lang="de-DE" dirty="0"/>
+              <a:t>Transaction </a:t>
+            </a:r>
+            <a:r>
+              <a:rPr lang="de-DE" dirty="0" err="1"/>
+              <a:t>Malleability</a:t>
+            </a:r>
+            <a:r>
+              <a:rPr lang="de-DE" dirty="0"/>
+              <a:t> gefixt</a:t>
+            </a:r>
+          </a:p>
+          <a:p>
+            <a:pPr marL="0" indent="0">
+              <a:buNone/>
+            </a:pPr>
+            <a:endParaRPr lang="de-DE" dirty="0"/>
+          </a:p>
+          <a:p>
+            <a:r>
+              <a:rPr lang="de-DE" dirty="0" err="1"/>
+              <a:t>Scaling</a:t>
+            </a:r>
+            <a:r>
+              <a:rPr lang="de-DE" dirty="0"/>
+              <a:t> Problem verbessert aber nicht gelöst</a:t>
+            </a:r>
+          </a:p>
+          <a:p>
+            <a:pPr marL="0" indent="0">
+              <a:buNone/>
+            </a:pPr>
+            <a:endParaRPr lang="de-DE" dirty="0"/>
+          </a:p>
+          <a:p>
+            <a:pPr marL="0" indent="0">
+              <a:buNone/>
+            </a:pPr>
+            <a:r>
+              <a:rPr lang="de-DE" dirty="0"/>
+              <a:t>→ Ermöglicht Lightning Network</a:t>
+            </a:r>
+          </a:p>
+        </p:txBody>
+      </p:sp>
+      <p:sp>
+        <p:nvSpPr>
+          <p:cNvPr id="4" name="Fußzeilenplatzhalter 3"/>
+          <p:cNvSpPr>
+            <a:spLocks noGrp="1"/>
+          </p:cNvSpPr>
+          <p:nvPr>
+            <p:ph type="ftr" sz="quarter" idx="10"/>
+          </p:nvPr>
+        </p:nvSpPr>
+        <p:spPr/>
+        <p:txBody>
+          <a:bodyPr/>
+          <a:lstStyle/>
+          <a:p>
+            <a:r>
+              <a:rPr lang="de-DE" altLang="de-DE" noProof="0"/>
+              <a:t>Stefan Krieg - Segregated Witness</a:t>
+            </a:r>
+            <a:endParaRPr lang="de-DE" altLang="de-DE" noProof="0" dirty="0"/>
+          </a:p>
+        </p:txBody>
+      </p:sp>
+      <p:sp>
+        <p:nvSpPr>
+          <p:cNvPr id="5" name="Datumsplatzhalter 4"/>
+          <p:cNvSpPr>
+            <a:spLocks noGrp="1"/>
+          </p:cNvSpPr>
+          <p:nvPr>
+            <p:ph type="dt" sz="half" idx="2"/>
+          </p:nvPr>
+        </p:nvSpPr>
+        <p:spPr/>
+        <p:txBody>
+          <a:bodyPr/>
+          <a:lstStyle/>
+          <a:p>
+            <a:fld id="{DAF4D9FD-1FBA-4D24-877D-BE1EF729A01D}" type="datetime1">
+              <a:rPr lang="de-DE" noProof="0" smtClean="0"/>
+              <a:t>05.07.2020</a:t>
+            </a:fld>
+            <a:endParaRPr lang="de-DE" noProof="0" dirty="0"/>
+          </a:p>
+        </p:txBody>
+      </p:sp>
+    </p:spTree>
+    <p:extLst>
+      <p:ext uri="{BB962C8B-B14F-4D97-AF65-F5344CB8AC3E}">
+        <p14:creationId xmlns:p14="http://schemas.microsoft.com/office/powerpoint/2010/main" val="1811949811"/>
+      </p:ext>
+    </p:extLst>
+  </p:cSld>
+  <p:clrMapOvr>
+    <a:masterClrMapping/>
+  </p:clrMapOvr>
+</p:sld>
+</file>
+
+<file path=ppt/slides/slide18.xml><?xml version="1.0" encoding="utf-8"?>
+<p:sld xmlns:a="http://schemas.openxmlformats.org/drawingml/2006/main" xmlns:r="http://schemas.openxmlformats.org/officeDocument/2006/relationships" xmlns:p="http://schemas.openxmlformats.org/presentationml/2006/main">
+  <p:cSld>
+    <p:spTree>
+      <p:nvGrpSpPr>
+        <p:cNvPr id="1" name=""/>
+        <p:cNvGrpSpPr/>
+        <p:nvPr/>
+      </p:nvGrpSpPr>
+      <p:grpSpPr>
+        <a:xfrm>
+          <a:off x="0" y="0"/>
+          <a:ext cx="0" cy="0"/>
+          <a:chOff x="0" y="0"/>
+          <a:chExt cx="0" cy="0"/>
+        </a:xfrm>
+      </p:grpSpPr>
+      <p:sp>
+        <p:nvSpPr>
+          <p:cNvPr id="2" name="Titel 1">
+            <a:extLst>
+              <a:ext uri="{FF2B5EF4-FFF2-40B4-BE49-F238E27FC236}">
+                <a16:creationId xmlns:a16="http://schemas.microsoft.com/office/drawing/2014/main" id="{3EAC1B05-64A5-4B77-9410-201A14413FEA}"/>
+              </a:ext>
+            </a:extLst>
+          </p:cNvPr>
+          <p:cNvSpPr>
+            <a:spLocks noGrp="1"/>
+          </p:cNvSpPr>
+          <p:nvPr>
+            <p:ph type="title"/>
+          </p:nvPr>
+        </p:nvSpPr>
+        <p:spPr/>
+        <p:txBody>
+          <a:bodyPr/>
+          <a:lstStyle/>
+          <a:p>
+            <a:r>
+              <a:rPr lang="de-DE" dirty="0"/>
+              <a:t>Fazit</a:t>
+            </a:r>
+          </a:p>
+        </p:txBody>
+      </p:sp>
+      <p:sp>
+        <p:nvSpPr>
+          <p:cNvPr id="3" name="Inhaltsplatzhalter 2">
+            <a:extLst>
+              <a:ext uri="{FF2B5EF4-FFF2-40B4-BE49-F238E27FC236}">
+                <a16:creationId xmlns:a16="http://schemas.microsoft.com/office/drawing/2014/main" id="{7F6C3545-0B76-467F-85A8-7C0EBD67D09F}"/>
+              </a:ext>
+            </a:extLst>
+          </p:cNvPr>
+          <p:cNvSpPr>
+            <a:spLocks noGrp="1"/>
+          </p:cNvSpPr>
+          <p:nvPr>
+            <p:ph idx="1"/>
+          </p:nvPr>
+        </p:nvSpPr>
+        <p:spPr/>
+        <p:txBody>
+          <a:bodyPr/>
+          <a:lstStyle/>
+          <a:p>
+            <a:r>
+              <a:rPr lang="de-DE" dirty="0"/>
+              <a:t>Einführung von </a:t>
+            </a:r>
+            <a:r>
+              <a:rPr lang="de-DE" dirty="0" err="1"/>
+              <a:t>SegWit</a:t>
+            </a:r>
+            <a:r>
+              <a:rPr lang="de-DE" dirty="0"/>
+              <a:t> sehr sinnvoll</a:t>
+            </a:r>
+          </a:p>
+          <a:p>
+            <a:pPr lvl="1"/>
+            <a:r>
+              <a:rPr lang="de-DE" dirty="0"/>
+              <a:t>Ermöglicht neue Technologien wie Lightning Network</a:t>
+            </a:r>
+          </a:p>
+          <a:p>
+            <a:pPr lvl="1"/>
+            <a:r>
+              <a:rPr lang="de-DE" dirty="0"/>
+              <a:t>Erhöht Blockgröße zu heute besser geeignetem Wert</a:t>
+            </a:r>
+          </a:p>
+          <a:p>
+            <a:pPr lvl="1"/>
+            <a:endParaRPr lang="de-DE" dirty="0"/>
+          </a:p>
+          <a:p>
+            <a:r>
+              <a:rPr lang="de-DE" dirty="0"/>
+              <a:t>Heute von Transaktionen ca. 50% </a:t>
+            </a:r>
+            <a:r>
+              <a:rPr lang="de-DE" dirty="0" err="1"/>
+              <a:t>SegWit</a:t>
+            </a:r>
+            <a:endParaRPr lang="de-DE" dirty="0"/>
+          </a:p>
+          <a:p>
+            <a:r>
+              <a:rPr lang="de-DE" dirty="0"/>
+              <a:t>Durchschnittliche Blockgröße von ca. 1.3 MB, Tendenz steigend</a:t>
+            </a:r>
+          </a:p>
+          <a:p>
+            <a:endParaRPr lang="de-DE" dirty="0"/>
+          </a:p>
+          <a:p>
+            <a:r>
+              <a:rPr lang="de-DE" dirty="0"/>
+              <a:t>Transaktionen pro Sekunde nicht deutlich gestiegen</a:t>
+            </a:r>
+          </a:p>
+          <a:p>
+            <a:pPr lvl="1"/>
+            <a:r>
+              <a:rPr lang="de-DE" dirty="0"/>
+              <a:t>Andere Lösung benötigt</a:t>
+            </a:r>
+          </a:p>
+        </p:txBody>
+      </p:sp>
+      <p:sp>
+        <p:nvSpPr>
+          <p:cNvPr id="4" name="Fußzeilenplatzhalter 3">
+            <a:extLst>
+              <a:ext uri="{FF2B5EF4-FFF2-40B4-BE49-F238E27FC236}">
+                <a16:creationId xmlns:a16="http://schemas.microsoft.com/office/drawing/2014/main" id="{964B51D6-4DBB-4426-BCDF-56B307561751}"/>
+              </a:ext>
+            </a:extLst>
+          </p:cNvPr>
+          <p:cNvSpPr>
+            <a:spLocks noGrp="1"/>
+          </p:cNvSpPr>
+          <p:nvPr>
+            <p:ph type="ftr" sz="quarter" idx="10"/>
+          </p:nvPr>
+        </p:nvSpPr>
+        <p:spPr/>
+        <p:txBody>
+          <a:bodyPr/>
+          <a:lstStyle/>
+          <a:p>
+            <a:r>
+              <a:rPr lang="de-DE" altLang="de-DE" noProof="0"/>
+              <a:t>Stefan Krieg - Segregated Witness</a:t>
+            </a:r>
+            <a:endParaRPr lang="de-DE" altLang="de-DE" noProof="0" dirty="0"/>
+          </a:p>
+        </p:txBody>
+      </p:sp>
+      <p:sp>
+        <p:nvSpPr>
+          <p:cNvPr id="5" name="Datumsplatzhalter 4">
+            <a:extLst>
+              <a:ext uri="{FF2B5EF4-FFF2-40B4-BE49-F238E27FC236}">
+                <a16:creationId xmlns:a16="http://schemas.microsoft.com/office/drawing/2014/main" id="{5AD8C7BB-8857-4310-8BCF-8F5229D892A1}"/>
+              </a:ext>
+            </a:extLst>
+          </p:cNvPr>
+          <p:cNvSpPr>
+            <a:spLocks noGrp="1"/>
+          </p:cNvSpPr>
+          <p:nvPr>
+            <p:ph type="dt" sz="half" idx="2"/>
+          </p:nvPr>
+        </p:nvSpPr>
+        <p:spPr/>
+        <p:txBody>
+          <a:bodyPr/>
+          <a:lstStyle/>
+          <a:p>
+            <a:fld id="{72DAF59A-2FDE-401A-8AE2-C818746C29D5}" type="datetime1">
+              <a:rPr lang="de-DE" noProof="0" smtClean="0"/>
+              <a:t>05.07.2020</a:t>
+            </a:fld>
+            <a:endParaRPr lang="de-DE" noProof="0" dirty="0"/>
+          </a:p>
+        </p:txBody>
+      </p:sp>
+    </p:spTree>
+    <p:extLst>
+      <p:ext uri="{BB962C8B-B14F-4D97-AF65-F5344CB8AC3E}">
+        <p14:creationId xmlns:p14="http://schemas.microsoft.com/office/powerpoint/2010/main" val="2744633057"/>
+      </p:ext>
+    </p:extLst>
   </p:cSld>
   <p:clrMapOvr>
     <a:masterClrMapping/>
@@ -5077,7 +6869,10 @@
           <a:bodyPr/>
           <a:lstStyle/>
           <a:p>
-            <a:endParaRPr lang="de-DE"/>
+            <a:r>
+              <a:rPr lang="de-DE" dirty="0"/>
+              <a:t>Gliederung</a:t>
+            </a:r>
           </a:p>
         </p:txBody>
       </p:sp>
@@ -5096,7 +6891,85 @@
           <a:bodyPr/>
           <a:lstStyle/>
           <a:p>
+            <a:r>
+              <a:rPr lang="de-DE" dirty="0"/>
+              <a:t>Motivation</a:t>
+            </a:r>
+          </a:p>
+          <a:p>
+            <a:r>
+              <a:rPr lang="de-DE" dirty="0"/>
+              <a:t>Grundlagen</a:t>
+            </a:r>
+          </a:p>
+          <a:p>
+            <a:pPr lvl="1"/>
+            <a:r>
+              <a:rPr lang="de-DE" dirty="0"/>
+              <a:t>Transaktion</a:t>
+            </a:r>
+          </a:p>
+          <a:p>
+            <a:pPr lvl="1"/>
+            <a:r>
+              <a:rPr lang="de-DE" dirty="0"/>
+              <a:t>Merkle </a:t>
+            </a:r>
+            <a:r>
+              <a:rPr lang="de-DE" dirty="0" err="1"/>
+              <a:t>Tree</a:t>
+            </a:r>
+            <a:r>
+              <a:rPr lang="de-DE" dirty="0"/>
+              <a:t> </a:t>
+            </a:r>
+          </a:p>
+          <a:p>
+            <a:r>
+              <a:rPr lang="de-DE" dirty="0"/>
+              <a:t>Probleme</a:t>
+            </a:r>
+          </a:p>
+          <a:p>
+            <a:pPr lvl="1"/>
+            <a:r>
+              <a:rPr lang="de-DE" dirty="0"/>
+              <a:t>Transaction </a:t>
+            </a:r>
+            <a:r>
+              <a:rPr lang="de-DE" dirty="0" err="1"/>
+              <a:t>Malleability</a:t>
+            </a:r>
             <a:endParaRPr lang="de-DE" dirty="0"/>
+          </a:p>
+          <a:p>
+            <a:pPr lvl="1"/>
+            <a:r>
+              <a:rPr lang="de-DE" dirty="0" err="1"/>
+              <a:t>Scaling</a:t>
+            </a:r>
+            <a:r>
+              <a:rPr lang="de-DE" dirty="0"/>
+              <a:t> Problem</a:t>
+            </a:r>
+          </a:p>
+          <a:p>
+            <a:r>
+              <a:rPr lang="de-DE" dirty="0"/>
+              <a:t>Lösung</a:t>
+            </a:r>
+          </a:p>
+          <a:p>
+            <a:r>
+              <a:rPr lang="de-DE" dirty="0"/>
+              <a:t>Evaluierung</a:t>
+            </a:r>
+          </a:p>
+          <a:p>
+            <a:r>
+              <a:rPr lang="de-DE" dirty="0"/>
+              <a:t>Fazit</a:t>
+            </a:r>
           </a:p>
         </p:txBody>
       </p:sp>
@@ -5117,7 +6990,7 @@
           <a:p>
             <a:r>
               <a:rPr lang="de-DE" altLang="de-DE" noProof="0"/>
-              <a:t>&lt;Presenter&gt; - &lt;Title&gt;</a:t>
+              <a:t>Stefan Krieg - Segregated Witness</a:t>
             </a:r>
             <a:endParaRPr lang="de-DE" altLang="de-DE" noProof="0" dirty="0"/>
           </a:p>
@@ -5138,9 +7011,9 @@
           <a:bodyPr/>
           <a:lstStyle/>
           <a:p>
-            <a:fld id="{7A5B5C66-4F04-4852-AC9C-67C3E6720CC5}" type="datetime1">
+            <a:fld id="{568A8805-CC31-4BEA-8C07-F4E13B79894A}" type="datetime1">
               <a:rPr lang="de-DE" noProof="0" smtClean="0"/>
-              <a:t>02.07.2020</a:t>
+              <a:t>05.07.2020</a:t>
             </a:fld>
             <a:endParaRPr lang="de-DE" noProof="0" dirty="0"/>
           </a:p>
@@ -5191,7 +7064,10 @@
           <a:bodyPr/>
           <a:lstStyle/>
           <a:p>
-            <a:endParaRPr lang="de-DE"/>
+            <a:r>
+              <a:rPr lang="de-DE" dirty="0"/>
+              <a:t>Motivation</a:t>
+            </a:r>
           </a:p>
         </p:txBody>
       </p:sp>
@@ -5231,7 +7107,7 @@
           <a:p>
             <a:r>
               <a:rPr lang="de-DE" altLang="de-DE" noProof="0"/>
-              <a:t>&lt;Presenter&gt; - &lt;Title&gt;</a:t>
+              <a:t>Stefan Krieg - Segregated Witness</a:t>
             </a:r>
             <a:endParaRPr lang="de-DE" altLang="de-DE" noProof="0" dirty="0"/>
           </a:p>
@@ -5252,9 +7128,9 @@
           <a:bodyPr/>
           <a:lstStyle/>
           <a:p>
-            <a:fld id="{7A5B5C66-4F04-4852-AC9C-67C3E6720CC5}" type="datetime1">
+            <a:fld id="{6E66855F-0D41-456D-A0AF-587DBE8AE63E}" type="datetime1">
               <a:rPr lang="de-DE" noProof="0" smtClean="0"/>
-              <a:t>02.07.2020</a:t>
+              <a:t>05.07.2020</a:t>
             </a:fld>
             <a:endParaRPr lang="de-DE" noProof="0" dirty="0"/>
           </a:p>
@@ -5292,7 +7168,13 @@
       </p:grpSpPr>
       <p:sp>
         <p:nvSpPr>
-          <p:cNvPr id="2" name="Titel 1"/>
+          <p:cNvPr id="2" name="Titel 1">
+            <a:extLst>
+              <a:ext uri="{FF2B5EF4-FFF2-40B4-BE49-F238E27FC236}">
+                <a16:creationId xmlns:a16="http://schemas.microsoft.com/office/drawing/2014/main" id="{7096183F-E9A4-4ACB-A4C0-FDEB4F2684E9}"/>
+              </a:ext>
+            </a:extLst>
+          </p:cNvPr>
           <p:cNvSpPr>
             <a:spLocks noGrp="1"/>
           </p:cNvSpPr>
@@ -5305,13 +7187,22 @@
           <a:bodyPr/>
           <a:lstStyle/>
           <a:p>
-            <a:endParaRPr lang="de-DE"/>
-          </a:p>
-        </p:txBody>
-      </p:sp>
-      <p:sp>
-        <p:nvSpPr>
-          <p:cNvPr id="3" name="Inhaltsplatzhalter 2"/>
+            <a:r>
+              <a:rPr lang="de-DE" dirty="0"/>
+              <a:t>Ziel der Arbeit</a:t>
+            </a:r>
+          </a:p>
+        </p:txBody>
+      </p:sp>
+      <p:sp>
+        <p:nvSpPr>
+          <p:cNvPr id="3" name="Inhaltsplatzhalter 2">
+            <a:extLst>
+              <a:ext uri="{FF2B5EF4-FFF2-40B4-BE49-F238E27FC236}">
+                <a16:creationId xmlns:a16="http://schemas.microsoft.com/office/drawing/2014/main" id="{90C0888D-2E99-4F76-8A6C-6AC124C11A1B}"/>
+              </a:ext>
+            </a:extLst>
+          </p:cNvPr>
           <p:cNvSpPr>
             <a:spLocks noGrp="1"/>
           </p:cNvSpPr>
@@ -5324,13 +7215,61 @@
           <a:bodyPr/>
           <a:lstStyle/>
           <a:p>
+            <a:r>
+              <a:rPr lang="de-DE" dirty="0"/>
+              <a:t>Inwiefern löst </a:t>
+            </a:r>
+            <a:r>
+              <a:rPr lang="de-DE" dirty="0" err="1"/>
+              <a:t>SegWit</a:t>
+            </a:r>
+            <a:r>
+              <a:rPr lang="de-DE" dirty="0"/>
+              <a:t> die Probleme Transaction </a:t>
+            </a:r>
+            <a:r>
+              <a:rPr lang="de-DE" dirty="0" err="1"/>
+              <a:t>Malleability</a:t>
+            </a:r>
+            <a:r>
+              <a:rPr lang="de-DE" dirty="0"/>
+              <a:t> und das </a:t>
+            </a:r>
+            <a:r>
+              <a:rPr lang="de-DE" dirty="0" err="1"/>
+              <a:t>Scaling</a:t>
+            </a:r>
+            <a:r>
+              <a:rPr lang="de-DE" dirty="0"/>
+              <a:t> Problem?</a:t>
+            </a:r>
+          </a:p>
+          <a:p>
+            <a:pPr marL="0" indent="0">
+              <a:buNone/>
+            </a:pPr>
             <a:endParaRPr lang="de-DE" dirty="0"/>
           </a:p>
-        </p:txBody>
-      </p:sp>
-      <p:sp>
-        <p:nvSpPr>
-          <p:cNvPr id="4" name="Fußzeilenplatzhalter 3"/>
+          <a:p>
+            <a:r>
+              <a:rPr lang="de-DE" dirty="0"/>
+              <a:t>Technische Umsetzung</a:t>
+            </a:r>
+          </a:p>
+          <a:p>
+            <a:endParaRPr lang="de-DE" dirty="0"/>
+          </a:p>
+        </p:txBody>
+      </p:sp>
+      <p:sp>
+        <p:nvSpPr>
+          <p:cNvPr id="4" name="Fußzeilenplatzhalter 3">
+            <a:extLst>
+              <a:ext uri="{FF2B5EF4-FFF2-40B4-BE49-F238E27FC236}">
+                <a16:creationId xmlns:a16="http://schemas.microsoft.com/office/drawing/2014/main" id="{DA82B504-69BC-4FC5-B303-A04EF0CE5747}"/>
+              </a:ext>
+            </a:extLst>
+          </p:cNvPr>
           <p:cNvSpPr>
             <a:spLocks noGrp="1"/>
           </p:cNvSpPr>
@@ -5345,7 +7284,7 @@
           <a:p>
             <a:r>
               <a:rPr lang="de-DE" altLang="de-DE" noProof="0"/>
-              <a:t>&lt;Presenter&gt; - &lt;Title&gt;</a:t>
+              <a:t>Stefan Krieg - Segregated Witness</a:t>
             </a:r>
             <a:endParaRPr lang="de-DE" altLang="de-DE" noProof="0" dirty="0"/>
           </a:p>
@@ -5353,7 +7292,13 @@
       </p:sp>
       <p:sp>
         <p:nvSpPr>
-          <p:cNvPr id="5" name="Datumsplatzhalter 4"/>
+          <p:cNvPr id="5" name="Datumsplatzhalter 4">
+            <a:extLst>
+              <a:ext uri="{FF2B5EF4-FFF2-40B4-BE49-F238E27FC236}">
+                <a16:creationId xmlns:a16="http://schemas.microsoft.com/office/drawing/2014/main" id="{1B48F281-DC99-45B3-81F7-A26CFEB3941F}"/>
+              </a:ext>
+            </a:extLst>
+          </p:cNvPr>
           <p:cNvSpPr>
             <a:spLocks noGrp="1"/>
           </p:cNvSpPr>
@@ -5366,9 +7311,9 @@
           <a:bodyPr/>
           <a:lstStyle/>
           <a:p>
-            <a:fld id="{7A5B5C66-4F04-4852-AC9C-67C3E6720CC5}" type="datetime1">
+            <a:fld id="{7A7A0B3B-8EF1-43DB-9A05-9913B3E55C42}" type="datetime1">
               <a:rPr lang="de-DE" noProof="0" smtClean="0"/>
-              <a:t>02.07.2020</a:t>
+              <a:t>06.07.2020</a:t>
             </a:fld>
             <a:endParaRPr lang="de-DE" noProof="0" dirty="0"/>
           </a:p>
@@ -5377,7 +7322,7 @@
     </p:spTree>
     <p:extLst>
       <p:ext uri="{BB962C8B-B14F-4D97-AF65-F5344CB8AC3E}">
-        <p14:creationId xmlns:p14="http://schemas.microsoft.com/office/powerpoint/2010/main" val="595356017"/>
+        <p14:creationId xmlns:p14="http://schemas.microsoft.com/office/powerpoint/2010/main" val="2030698155"/>
       </p:ext>
     </p:extLst>
   </p:cSld>
@@ -5406,7 +7351,13 @@
       </p:grpSpPr>
       <p:sp>
         <p:nvSpPr>
-          <p:cNvPr id="2" name="Titel 1"/>
+          <p:cNvPr id="2" name="Titel 1">
+            <a:extLst>
+              <a:ext uri="{FF2B5EF4-FFF2-40B4-BE49-F238E27FC236}">
+                <a16:creationId xmlns:a16="http://schemas.microsoft.com/office/drawing/2014/main" id="{E6355D96-7C82-410C-A47F-70B951FE57D7}"/>
+              </a:ext>
+            </a:extLst>
+          </p:cNvPr>
           <p:cNvSpPr>
             <a:spLocks noGrp="1"/>
           </p:cNvSpPr>
@@ -5414,23 +7365,37 @@
             <p:ph type="title"/>
           </p:nvPr>
         </p:nvSpPr>
-        <p:spPr/>
+        <p:spPr>
+          <a:xfrm>
+            <a:off x="2628900" y="3088481"/>
+            <a:ext cx="3886200" cy="681038"/>
+          </a:xfrm>
+        </p:spPr>
         <p:txBody>
           <a:bodyPr/>
           <a:lstStyle/>
           <a:p>
-            <a:endParaRPr lang="de-DE"/>
-          </a:p>
-        </p:txBody>
-      </p:sp>
-      <p:sp>
-        <p:nvSpPr>
-          <p:cNvPr id="3" name="Inhaltsplatzhalter 2"/>
-          <p:cNvSpPr>
-            <a:spLocks noGrp="1"/>
-          </p:cNvSpPr>
-          <p:nvPr>
-            <p:ph idx="1"/>
+            <a:r>
+              <a:rPr lang="de-DE" dirty="0"/>
+              <a:t>Grundlagen</a:t>
+            </a:r>
+          </a:p>
+        </p:txBody>
+      </p:sp>
+      <p:sp>
+        <p:nvSpPr>
+          <p:cNvPr id="4" name="Fußzeilenplatzhalter 3">
+            <a:extLst>
+              <a:ext uri="{FF2B5EF4-FFF2-40B4-BE49-F238E27FC236}">
+                <a16:creationId xmlns:a16="http://schemas.microsoft.com/office/drawing/2014/main" id="{51A591E0-DB3E-4477-8B35-EAA811FB3D6E}"/>
+              </a:ext>
+            </a:extLst>
+          </p:cNvPr>
+          <p:cNvSpPr>
+            <a:spLocks noGrp="1"/>
+          </p:cNvSpPr>
+          <p:nvPr>
+            <p:ph type="ftr" sz="quarter" idx="10"/>
           </p:nvPr>
         </p:nvSpPr>
         <p:spPr/>
@@ -5438,18 +7403,28 @@
           <a:bodyPr/>
           <a:lstStyle/>
           <a:p>
-            <a:endParaRPr lang="de-DE" dirty="0"/>
-          </a:p>
-        </p:txBody>
-      </p:sp>
-      <p:sp>
-        <p:nvSpPr>
-          <p:cNvPr id="4" name="Fußzeilenplatzhalter 3"/>
-          <p:cNvSpPr>
-            <a:spLocks noGrp="1"/>
-          </p:cNvSpPr>
-          <p:nvPr>
-            <p:ph type="ftr" sz="quarter" idx="10"/>
+            <a:r>
+              <a:rPr lang="de-DE" altLang="de-DE" noProof="0"/>
+              <a:t>Stefan Krieg - Segregated Witness</a:t>
+            </a:r>
+            <a:endParaRPr lang="de-DE" altLang="de-DE" noProof="0" dirty="0"/>
+          </a:p>
+        </p:txBody>
+      </p:sp>
+      <p:sp>
+        <p:nvSpPr>
+          <p:cNvPr id="5" name="Datumsplatzhalter 4">
+            <a:extLst>
+              <a:ext uri="{FF2B5EF4-FFF2-40B4-BE49-F238E27FC236}">
+                <a16:creationId xmlns:a16="http://schemas.microsoft.com/office/drawing/2014/main" id="{EF0B30EB-2C10-4AFB-A37C-263F72978216}"/>
+              </a:ext>
+            </a:extLst>
+          </p:cNvPr>
+          <p:cNvSpPr>
+            <a:spLocks noGrp="1"/>
+          </p:cNvSpPr>
+          <p:nvPr>
+            <p:ph type="dt" sz="half" idx="2"/>
           </p:nvPr>
         </p:nvSpPr>
         <p:spPr/>
@@ -5457,32 +7432,9 @@
           <a:bodyPr/>
           <a:lstStyle/>
           <a:p>
-            <a:r>
-              <a:rPr lang="de-DE" altLang="de-DE" noProof="0"/>
-              <a:t>&lt;Presenter&gt; - &lt;Title&gt;</a:t>
-            </a:r>
-            <a:endParaRPr lang="de-DE" altLang="de-DE" noProof="0" dirty="0"/>
-          </a:p>
-        </p:txBody>
-      </p:sp>
-      <p:sp>
-        <p:nvSpPr>
-          <p:cNvPr id="5" name="Datumsplatzhalter 4"/>
-          <p:cNvSpPr>
-            <a:spLocks noGrp="1"/>
-          </p:cNvSpPr>
-          <p:nvPr>
-            <p:ph type="dt" sz="half" idx="2"/>
-          </p:nvPr>
-        </p:nvSpPr>
-        <p:spPr/>
-        <p:txBody>
-          <a:bodyPr/>
-          <a:lstStyle/>
-          <a:p>
-            <a:fld id="{7A5B5C66-4F04-4852-AC9C-67C3E6720CC5}" type="datetime1">
+            <a:fld id="{2264CB09-F063-447F-A5D5-08DBE24D7A02}" type="datetime1">
               <a:rPr lang="de-DE" noProof="0" smtClean="0"/>
-              <a:t>02.07.2020</a:t>
+              <a:t>05.07.2020</a:t>
             </a:fld>
             <a:endParaRPr lang="de-DE" noProof="0" dirty="0"/>
           </a:p>
@@ -5491,7 +7443,7 @@
     </p:spTree>
     <p:extLst>
       <p:ext uri="{BB962C8B-B14F-4D97-AF65-F5344CB8AC3E}">
-        <p14:creationId xmlns:p14="http://schemas.microsoft.com/office/powerpoint/2010/main" val="3041062261"/>
+        <p14:creationId xmlns:p14="http://schemas.microsoft.com/office/powerpoint/2010/main" val="1985644844"/>
       </p:ext>
     </p:extLst>
   </p:cSld>
@@ -5520,7 +7472,13 @@
       </p:grpSpPr>
       <p:sp>
         <p:nvSpPr>
-          <p:cNvPr id="2" name="Titel 1"/>
+          <p:cNvPr id="2" name="Titel 1">
+            <a:extLst>
+              <a:ext uri="{FF2B5EF4-FFF2-40B4-BE49-F238E27FC236}">
+                <a16:creationId xmlns:a16="http://schemas.microsoft.com/office/drawing/2014/main" id="{0254B889-B3C4-40B1-88F5-A7A34F3A0251}"/>
+              </a:ext>
+            </a:extLst>
+          </p:cNvPr>
           <p:cNvSpPr>
             <a:spLocks noGrp="1"/>
           </p:cNvSpPr>
@@ -5533,18 +7491,62 @@
           <a:bodyPr/>
           <a:lstStyle/>
           <a:p>
-            <a:endParaRPr lang="de-DE"/>
-          </a:p>
-        </p:txBody>
-      </p:sp>
-      <p:sp>
-        <p:nvSpPr>
-          <p:cNvPr id="3" name="Inhaltsplatzhalter 2"/>
-          <p:cNvSpPr>
-            <a:spLocks noGrp="1"/>
-          </p:cNvSpPr>
+            <a:r>
+              <a:rPr lang="de-DE" dirty="0"/>
+              <a:t>Transaktionen</a:t>
+            </a:r>
+          </a:p>
+        </p:txBody>
+      </p:sp>
+      <p:pic>
+        <p:nvPicPr>
+          <p:cNvPr id="7" name="Inhaltsplatzhalter 6" descr="Ein Bild, das Screenshot enthält.&#10;&#10;Automatisch generierte Beschreibung">
+            <a:extLst>
+              <a:ext uri="{FF2B5EF4-FFF2-40B4-BE49-F238E27FC236}">
+                <a16:creationId xmlns:a16="http://schemas.microsoft.com/office/drawing/2014/main" id="{DD14C4E8-EEBD-439E-A898-741D6BE7633F}"/>
+              </a:ext>
+            </a:extLst>
+          </p:cNvPr>
+          <p:cNvPicPr>
+            <a:picLocks noGrp="1" noChangeAspect="1"/>
+          </p:cNvPicPr>
           <p:nvPr>
             <p:ph idx="1"/>
+          </p:nvPr>
+        </p:nvPicPr>
+        <p:blipFill>
+          <a:blip r:embed="rId2">
+            <a:extLst>
+              <a:ext uri="{28A0092B-C50C-407E-A947-70E740481C1C}">
+                <a14:useLocalDpi xmlns:a14="http://schemas.microsoft.com/office/drawing/2010/main" val="0"/>
+              </a:ext>
+            </a:extLst>
+          </a:blip>
+          <a:stretch>
+            <a:fillRect/>
+          </a:stretch>
+        </p:blipFill>
+        <p:spPr>
+          <a:xfrm>
+            <a:off x="392113" y="1304739"/>
+            <a:ext cx="8356600" cy="4681909"/>
+          </a:xfrm>
+        </p:spPr>
+      </p:pic>
+      <p:sp>
+        <p:nvSpPr>
+          <p:cNvPr id="4" name="Fußzeilenplatzhalter 3">
+            <a:extLst>
+              <a:ext uri="{FF2B5EF4-FFF2-40B4-BE49-F238E27FC236}">
+                <a16:creationId xmlns:a16="http://schemas.microsoft.com/office/drawing/2014/main" id="{68202ADB-2A72-4643-BB09-04B872CD5773}"/>
+              </a:ext>
+            </a:extLst>
+          </p:cNvPr>
+          <p:cNvSpPr>
+            <a:spLocks noGrp="1"/>
+          </p:cNvSpPr>
+          <p:nvPr>
+            <p:ph type="ftr" sz="quarter" idx="10"/>
           </p:nvPr>
         </p:nvSpPr>
         <p:spPr/>
@@ -5552,18 +7554,28 @@
           <a:bodyPr/>
           <a:lstStyle/>
           <a:p>
-            <a:endParaRPr lang="de-DE" dirty="0"/>
-          </a:p>
-        </p:txBody>
-      </p:sp>
-      <p:sp>
-        <p:nvSpPr>
-          <p:cNvPr id="4" name="Fußzeilenplatzhalter 3"/>
-          <p:cNvSpPr>
-            <a:spLocks noGrp="1"/>
-          </p:cNvSpPr>
-          <p:nvPr>
-            <p:ph type="ftr" sz="quarter" idx="10"/>
+            <a:r>
+              <a:rPr lang="de-DE" altLang="de-DE"/>
+              <a:t>Stefan Krieg - Segregated Witness</a:t>
+            </a:r>
+            <a:endParaRPr lang="de-DE" altLang="de-DE" noProof="0" dirty="0"/>
+          </a:p>
+        </p:txBody>
+      </p:sp>
+      <p:sp>
+        <p:nvSpPr>
+          <p:cNvPr id="5" name="Datumsplatzhalter 4">
+            <a:extLst>
+              <a:ext uri="{FF2B5EF4-FFF2-40B4-BE49-F238E27FC236}">
+                <a16:creationId xmlns:a16="http://schemas.microsoft.com/office/drawing/2014/main" id="{684D48EC-A588-41B8-ACE2-4518B3E62374}"/>
+              </a:ext>
+            </a:extLst>
+          </p:cNvPr>
+          <p:cNvSpPr>
+            <a:spLocks noGrp="1"/>
+          </p:cNvSpPr>
+          <p:nvPr>
+            <p:ph type="dt" sz="half" idx="2"/>
           </p:nvPr>
         </p:nvSpPr>
         <p:spPr/>
@@ -5571,41 +7583,60 @@
           <a:bodyPr/>
           <a:lstStyle/>
           <a:p>
-            <a:r>
-              <a:rPr lang="de-DE" altLang="de-DE" noProof="0"/>
-              <a:t>&lt;Presenter&gt; - &lt;Title&gt;</a:t>
-            </a:r>
-            <a:endParaRPr lang="de-DE" altLang="de-DE" noProof="0" dirty="0"/>
-          </a:p>
-        </p:txBody>
-      </p:sp>
-      <p:sp>
-        <p:nvSpPr>
-          <p:cNvPr id="5" name="Datumsplatzhalter 4"/>
-          <p:cNvSpPr>
-            <a:spLocks noGrp="1"/>
-          </p:cNvSpPr>
-          <p:nvPr>
-            <p:ph type="dt" sz="half" idx="2"/>
-          </p:nvPr>
-        </p:nvSpPr>
-        <p:spPr/>
-        <p:txBody>
-          <a:bodyPr/>
-          <a:lstStyle/>
-          <a:p>
-            <a:fld id="{7A5B5C66-4F04-4852-AC9C-67C3E6720CC5}" type="datetime1">
+            <a:fld id="{E841CB45-F91E-47B4-8238-B69A758DF461}" type="datetime1">
               <a:rPr lang="de-DE" noProof="0" smtClean="0"/>
-              <a:t>02.07.2020</a:t>
+              <a:t>05.07.2020</a:t>
             </a:fld>
             <a:endParaRPr lang="de-DE" noProof="0" dirty="0"/>
+          </a:p>
+        </p:txBody>
+      </p:sp>
+      <p:sp>
+        <p:nvSpPr>
+          <p:cNvPr id="8" name="Textfeld 7">
+            <a:extLst>
+              <a:ext uri="{FF2B5EF4-FFF2-40B4-BE49-F238E27FC236}">
+                <a16:creationId xmlns:a16="http://schemas.microsoft.com/office/drawing/2014/main" id="{61347E6B-968A-43C0-9FB1-84C42BCEFE96}"/>
+              </a:ext>
+            </a:extLst>
+          </p:cNvPr>
+          <p:cNvSpPr txBox="1"/>
+          <p:nvPr/>
+        </p:nvSpPr>
+        <p:spPr>
+          <a:xfrm>
+            <a:off x="3149048" y="5986648"/>
+            <a:ext cx="2845903" cy="246221"/>
+          </a:xfrm>
+          <a:prstGeom prst="rect">
+            <a:avLst/>
+          </a:prstGeom>
+          <a:noFill/>
+        </p:spPr>
+        <p:txBody>
+          <a:bodyPr wrap="square" rtlCol="0">
+            <a:spAutoFit/>
+          </a:bodyPr>
+          <a:lstStyle/>
+          <a:p>
+            <a:r>
+              <a:rPr lang="de-DE" sz="1000" dirty="0"/>
+              <a:t>Bildquelle: </a:t>
+            </a:r>
+            <a:r>
+              <a:rPr lang="de-DE" sz="1000" dirty="0">
+                <a:hlinkClick r:id="rId3"/>
+              </a:rPr>
+              <a:t>https://i.stack.imgur.com/YXguz.png</a:t>
+            </a:r>
+            <a:endParaRPr lang="de-DE" sz="1000" dirty="0"/>
           </a:p>
         </p:txBody>
       </p:sp>
     </p:spTree>
     <p:extLst>
       <p:ext uri="{BB962C8B-B14F-4D97-AF65-F5344CB8AC3E}">
-        <p14:creationId xmlns:p14="http://schemas.microsoft.com/office/powerpoint/2010/main" val="2750674219"/>
+        <p14:creationId xmlns:p14="http://schemas.microsoft.com/office/powerpoint/2010/main" val="2616017764"/>
       </p:ext>
     </p:extLst>
   </p:cSld>
@@ -5634,7 +7665,13 @@
       </p:grpSpPr>
       <p:sp>
         <p:nvSpPr>
-          <p:cNvPr id="2" name="Titel 1"/>
+          <p:cNvPr id="2" name="Titel 1">
+            <a:extLst>
+              <a:ext uri="{FF2B5EF4-FFF2-40B4-BE49-F238E27FC236}">
+                <a16:creationId xmlns:a16="http://schemas.microsoft.com/office/drawing/2014/main" id="{92181177-1A23-4D7D-983E-34A9682A1CBD}"/>
+              </a:ext>
+            </a:extLst>
+          </p:cNvPr>
           <p:cNvSpPr>
             <a:spLocks noGrp="1"/>
           </p:cNvSpPr>
@@ -5647,18 +7684,67 @@
           <a:bodyPr/>
           <a:lstStyle/>
           <a:p>
-            <a:endParaRPr lang="de-DE"/>
-          </a:p>
-        </p:txBody>
-      </p:sp>
-      <p:sp>
-        <p:nvSpPr>
-          <p:cNvPr id="3" name="Inhaltsplatzhalter 2"/>
-          <p:cNvSpPr>
-            <a:spLocks noGrp="1"/>
-          </p:cNvSpPr>
+            <a:r>
+              <a:rPr lang="de-DE" dirty="0"/>
+              <a:t>Merkle </a:t>
+            </a:r>
+            <a:r>
+              <a:rPr lang="de-DE" dirty="0" err="1"/>
+              <a:t>Tree</a:t>
+            </a:r>
+            <a:endParaRPr lang="de-DE" dirty="0"/>
+          </a:p>
+        </p:txBody>
+      </p:sp>
+      <p:pic>
+        <p:nvPicPr>
+          <p:cNvPr id="7" name="Inhaltsplatzhalter 6">
+            <a:extLst>
+              <a:ext uri="{FF2B5EF4-FFF2-40B4-BE49-F238E27FC236}">
+                <a16:creationId xmlns:a16="http://schemas.microsoft.com/office/drawing/2014/main" id="{D987B713-6040-4653-A95F-8125862F0A83}"/>
+              </a:ext>
+            </a:extLst>
+          </p:cNvPr>
+          <p:cNvPicPr>
+            <a:picLocks noGrp="1" noChangeAspect="1"/>
+          </p:cNvPicPr>
           <p:nvPr>
             <p:ph idx="1"/>
+          </p:nvPr>
+        </p:nvPicPr>
+        <p:blipFill>
+          <a:blip r:embed="rId2">
+            <a:extLst>
+              <a:ext uri="{28A0092B-C50C-407E-A947-70E740481C1C}">
+                <a14:useLocalDpi xmlns:a14="http://schemas.microsoft.com/office/drawing/2010/main" val="0"/>
+              </a:ext>
+            </a:extLst>
+          </a:blip>
+          <a:stretch>
+            <a:fillRect/>
+          </a:stretch>
+        </p:blipFill>
+        <p:spPr>
+          <a:xfrm>
+            <a:off x="863277" y="1085050"/>
+            <a:ext cx="7936275" cy="4894262"/>
+          </a:xfrm>
+        </p:spPr>
+      </p:pic>
+      <p:sp>
+        <p:nvSpPr>
+          <p:cNvPr id="4" name="Fußzeilenplatzhalter 3">
+            <a:extLst>
+              <a:ext uri="{FF2B5EF4-FFF2-40B4-BE49-F238E27FC236}">
+                <a16:creationId xmlns:a16="http://schemas.microsoft.com/office/drawing/2014/main" id="{AB8DA2F6-8D63-46C2-BE2C-CC6C20B54D97}"/>
+              </a:ext>
+            </a:extLst>
+          </p:cNvPr>
+          <p:cNvSpPr>
+            <a:spLocks noGrp="1"/>
+          </p:cNvSpPr>
+          <p:nvPr>
+            <p:ph type="ftr" sz="quarter" idx="10"/>
           </p:nvPr>
         </p:nvSpPr>
         <p:spPr/>
@@ -5666,18 +7752,28 @@
           <a:bodyPr/>
           <a:lstStyle/>
           <a:p>
-            <a:endParaRPr lang="de-DE" dirty="0"/>
-          </a:p>
-        </p:txBody>
-      </p:sp>
-      <p:sp>
-        <p:nvSpPr>
-          <p:cNvPr id="4" name="Fußzeilenplatzhalter 3"/>
-          <p:cNvSpPr>
-            <a:spLocks noGrp="1"/>
-          </p:cNvSpPr>
-          <p:nvPr>
-            <p:ph type="ftr" sz="quarter" idx="10"/>
+            <a:r>
+              <a:rPr lang="de-DE" altLang="de-DE" noProof="0"/>
+              <a:t>Stefan Krieg - Segregated Witness</a:t>
+            </a:r>
+            <a:endParaRPr lang="de-DE" altLang="de-DE" noProof="0" dirty="0"/>
+          </a:p>
+        </p:txBody>
+      </p:sp>
+      <p:sp>
+        <p:nvSpPr>
+          <p:cNvPr id="5" name="Datumsplatzhalter 4">
+            <a:extLst>
+              <a:ext uri="{FF2B5EF4-FFF2-40B4-BE49-F238E27FC236}">
+                <a16:creationId xmlns:a16="http://schemas.microsoft.com/office/drawing/2014/main" id="{FDD86338-62BF-4C84-86C7-F699A4021BD1}"/>
+              </a:ext>
+            </a:extLst>
+          </p:cNvPr>
+          <p:cNvSpPr>
+            <a:spLocks noGrp="1"/>
+          </p:cNvSpPr>
+          <p:nvPr>
+            <p:ph type="dt" sz="half" idx="2"/>
           </p:nvPr>
         </p:nvSpPr>
         <p:spPr/>
@@ -5685,41 +7781,60 @@
           <a:bodyPr/>
           <a:lstStyle/>
           <a:p>
-            <a:r>
-              <a:rPr lang="de-DE" altLang="de-DE" noProof="0"/>
-              <a:t>&lt;Presenter&gt; - &lt;Title&gt;</a:t>
-            </a:r>
-            <a:endParaRPr lang="de-DE" altLang="de-DE" noProof="0" dirty="0"/>
-          </a:p>
-        </p:txBody>
-      </p:sp>
-      <p:sp>
-        <p:nvSpPr>
-          <p:cNvPr id="5" name="Datumsplatzhalter 4"/>
-          <p:cNvSpPr>
-            <a:spLocks noGrp="1"/>
-          </p:cNvSpPr>
-          <p:nvPr>
-            <p:ph type="dt" sz="half" idx="2"/>
-          </p:nvPr>
-        </p:nvSpPr>
-        <p:spPr/>
-        <p:txBody>
-          <a:bodyPr/>
-          <a:lstStyle/>
-          <a:p>
-            <a:fld id="{7A5B5C66-4F04-4852-AC9C-67C3E6720CC5}" type="datetime1">
+            <a:fld id="{3FCEF11A-4745-4BA1-8705-214495E93290}" type="datetime1">
               <a:rPr lang="de-DE" noProof="0" smtClean="0"/>
-              <a:t>02.07.2020</a:t>
+              <a:t>05.07.2020</a:t>
             </a:fld>
             <a:endParaRPr lang="de-DE" noProof="0" dirty="0"/>
+          </a:p>
+        </p:txBody>
+      </p:sp>
+      <p:sp>
+        <p:nvSpPr>
+          <p:cNvPr id="8" name="Textfeld 7">
+            <a:extLst>
+              <a:ext uri="{FF2B5EF4-FFF2-40B4-BE49-F238E27FC236}">
+                <a16:creationId xmlns:a16="http://schemas.microsoft.com/office/drawing/2014/main" id="{0AA190BB-9782-4CC4-B1FC-D08FCE064439}"/>
+              </a:ext>
+            </a:extLst>
+          </p:cNvPr>
+          <p:cNvSpPr txBox="1"/>
+          <p:nvPr/>
+        </p:nvSpPr>
+        <p:spPr>
+          <a:xfrm>
+            <a:off x="2172553" y="5856201"/>
+            <a:ext cx="4798893" cy="246221"/>
+          </a:xfrm>
+          <a:prstGeom prst="rect">
+            <a:avLst/>
+          </a:prstGeom>
+          <a:noFill/>
+        </p:spPr>
+        <p:txBody>
+          <a:bodyPr wrap="square" rtlCol="0">
+            <a:spAutoFit/>
+          </a:bodyPr>
+          <a:lstStyle/>
+          <a:p>
+            <a:r>
+              <a:rPr lang="de-DE" sz="1000" dirty="0"/>
+              <a:t>Bildquelle: </a:t>
+            </a:r>
+            <a:r>
+              <a:rPr lang="de-DE" sz="1000" dirty="0">
+                <a:hlinkClick r:id="rId3"/>
+              </a:rPr>
+              <a:t>https://miro.medium.com/max/1174/1*prtcx2rVQZmX9oZcyrC_gQ.png</a:t>
+            </a:r>
+            <a:endParaRPr lang="de-DE" sz="1000" dirty="0"/>
           </a:p>
         </p:txBody>
       </p:sp>
     </p:spTree>
     <p:extLst>
       <p:ext uri="{BB962C8B-B14F-4D97-AF65-F5344CB8AC3E}">
-        <p14:creationId xmlns:p14="http://schemas.microsoft.com/office/powerpoint/2010/main" val="707652004"/>
+        <p14:creationId xmlns:p14="http://schemas.microsoft.com/office/powerpoint/2010/main" val="4102603655"/>
       </p:ext>
     </p:extLst>
   </p:cSld>
@@ -5748,7 +7863,13 @@
       </p:grpSpPr>
       <p:sp>
         <p:nvSpPr>
-          <p:cNvPr id="2" name="Titel 1"/>
+          <p:cNvPr id="2" name="Titel 1">
+            <a:extLst>
+              <a:ext uri="{FF2B5EF4-FFF2-40B4-BE49-F238E27FC236}">
+                <a16:creationId xmlns:a16="http://schemas.microsoft.com/office/drawing/2014/main" id="{A11C1849-85F6-44B9-B413-65D99118A2F6}"/>
+              </a:ext>
+            </a:extLst>
+          </p:cNvPr>
           <p:cNvSpPr>
             <a:spLocks noGrp="1"/>
           </p:cNvSpPr>
@@ -5756,23 +7877,37 @@
             <p:ph type="title"/>
           </p:nvPr>
         </p:nvSpPr>
-        <p:spPr/>
+        <p:spPr>
+          <a:xfrm>
+            <a:off x="3036367" y="3125862"/>
+            <a:ext cx="2913583" cy="606276"/>
+          </a:xfrm>
+        </p:spPr>
         <p:txBody>
           <a:bodyPr/>
           <a:lstStyle/>
           <a:p>
-            <a:endParaRPr lang="de-DE"/>
-          </a:p>
-        </p:txBody>
-      </p:sp>
-      <p:sp>
-        <p:nvSpPr>
-          <p:cNvPr id="3" name="Inhaltsplatzhalter 2"/>
-          <p:cNvSpPr>
-            <a:spLocks noGrp="1"/>
-          </p:cNvSpPr>
-          <p:nvPr>
-            <p:ph idx="1"/>
+            <a:r>
+              <a:rPr lang="de-DE" dirty="0"/>
+              <a:t>Probleme</a:t>
+            </a:r>
+          </a:p>
+        </p:txBody>
+      </p:sp>
+      <p:sp>
+        <p:nvSpPr>
+          <p:cNvPr id="4" name="Fußzeilenplatzhalter 3">
+            <a:extLst>
+              <a:ext uri="{FF2B5EF4-FFF2-40B4-BE49-F238E27FC236}">
+                <a16:creationId xmlns:a16="http://schemas.microsoft.com/office/drawing/2014/main" id="{D7938C8D-34AE-4B0A-B049-3A55592404B6}"/>
+              </a:ext>
+            </a:extLst>
+          </p:cNvPr>
+          <p:cNvSpPr>
+            <a:spLocks noGrp="1"/>
+          </p:cNvSpPr>
+          <p:nvPr>
+            <p:ph type="ftr" sz="quarter" idx="10"/>
           </p:nvPr>
         </p:nvSpPr>
         <p:spPr/>
@@ -5780,18 +7915,28 @@
           <a:bodyPr/>
           <a:lstStyle/>
           <a:p>
-            <a:endParaRPr lang="de-DE" dirty="0"/>
-          </a:p>
-        </p:txBody>
-      </p:sp>
-      <p:sp>
-        <p:nvSpPr>
-          <p:cNvPr id="4" name="Fußzeilenplatzhalter 3"/>
-          <p:cNvSpPr>
-            <a:spLocks noGrp="1"/>
-          </p:cNvSpPr>
-          <p:nvPr>
-            <p:ph type="ftr" sz="quarter" idx="10"/>
+            <a:r>
+              <a:rPr lang="de-DE" altLang="de-DE" noProof="0"/>
+              <a:t>Stefan Krieg - Segregated Witness</a:t>
+            </a:r>
+            <a:endParaRPr lang="de-DE" altLang="de-DE" noProof="0" dirty="0"/>
+          </a:p>
+        </p:txBody>
+      </p:sp>
+      <p:sp>
+        <p:nvSpPr>
+          <p:cNvPr id="5" name="Datumsplatzhalter 4">
+            <a:extLst>
+              <a:ext uri="{FF2B5EF4-FFF2-40B4-BE49-F238E27FC236}">
+                <a16:creationId xmlns:a16="http://schemas.microsoft.com/office/drawing/2014/main" id="{32DC5986-3A7A-4A8D-AB8E-DFD9CE7D5AC1}"/>
+              </a:ext>
+            </a:extLst>
+          </p:cNvPr>
+          <p:cNvSpPr>
+            <a:spLocks noGrp="1"/>
+          </p:cNvSpPr>
+          <p:nvPr>
+            <p:ph type="dt" sz="half" idx="2"/>
           </p:nvPr>
         </p:nvSpPr>
         <p:spPr/>
@@ -5799,32 +7944,9 @@
           <a:bodyPr/>
           <a:lstStyle/>
           <a:p>
-            <a:r>
-              <a:rPr lang="de-DE" altLang="de-DE" noProof="0"/>
-              <a:t>&lt;Presenter&gt; - &lt;Title&gt;</a:t>
-            </a:r>
-            <a:endParaRPr lang="de-DE" altLang="de-DE" noProof="0" dirty="0"/>
-          </a:p>
-        </p:txBody>
-      </p:sp>
-      <p:sp>
-        <p:nvSpPr>
-          <p:cNvPr id="5" name="Datumsplatzhalter 4"/>
-          <p:cNvSpPr>
-            <a:spLocks noGrp="1"/>
-          </p:cNvSpPr>
-          <p:nvPr>
-            <p:ph type="dt" sz="half" idx="2"/>
-          </p:nvPr>
-        </p:nvSpPr>
-        <p:spPr/>
-        <p:txBody>
-          <a:bodyPr/>
-          <a:lstStyle/>
-          <a:p>
-            <a:fld id="{7A5B5C66-4F04-4852-AC9C-67C3E6720CC5}" type="datetime1">
+            <a:fld id="{2264CB09-F063-447F-A5D5-08DBE24D7A02}" type="datetime1">
               <a:rPr lang="de-DE" noProof="0" smtClean="0"/>
-              <a:t>02.07.2020</a:t>
+              <a:t>05.07.2020</a:t>
             </a:fld>
             <a:endParaRPr lang="de-DE" noProof="0" dirty="0"/>
           </a:p>
@@ -5833,7 +7955,173 @@
     </p:spTree>
     <p:extLst>
       <p:ext uri="{BB962C8B-B14F-4D97-AF65-F5344CB8AC3E}">
-        <p14:creationId xmlns:p14="http://schemas.microsoft.com/office/powerpoint/2010/main" val="1811949811"/>
+        <p14:creationId xmlns:p14="http://schemas.microsoft.com/office/powerpoint/2010/main" val="3260268105"/>
+      </p:ext>
+    </p:extLst>
+  </p:cSld>
+  <p:clrMapOvr>
+    <a:masterClrMapping/>
+  </p:clrMapOvr>
+</p:sld>
+</file>
+
+<file path=ppt/slides/slide9.xml><?xml version="1.0" encoding="utf-8"?>
+<p:sld xmlns:a="http://schemas.openxmlformats.org/drawingml/2006/main" xmlns:r="http://schemas.openxmlformats.org/officeDocument/2006/relationships" xmlns:p="http://schemas.openxmlformats.org/presentationml/2006/main">
+  <p:cSld>
+    <p:spTree>
+      <p:nvGrpSpPr>
+        <p:cNvPr id="1" name=""/>
+        <p:cNvGrpSpPr/>
+        <p:nvPr/>
+      </p:nvGrpSpPr>
+      <p:grpSpPr>
+        <a:xfrm>
+          <a:off x="0" y="0"/>
+          <a:ext cx="0" cy="0"/>
+          <a:chOff x="0" y="0"/>
+          <a:chExt cx="0" cy="0"/>
+        </a:xfrm>
+      </p:grpSpPr>
+      <p:sp>
+        <p:nvSpPr>
+          <p:cNvPr id="2" name="Titel 1">
+            <a:extLst>
+              <a:ext uri="{FF2B5EF4-FFF2-40B4-BE49-F238E27FC236}">
+                <a16:creationId xmlns:a16="http://schemas.microsoft.com/office/drawing/2014/main" id="{8C887236-05D4-4D3E-9A4D-8AC7F3C4BFE0}"/>
+              </a:ext>
+            </a:extLst>
+          </p:cNvPr>
+          <p:cNvSpPr>
+            <a:spLocks noGrp="1"/>
+          </p:cNvSpPr>
+          <p:nvPr>
+            <p:ph type="title"/>
+          </p:nvPr>
+        </p:nvSpPr>
+        <p:spPr/>
+        <p:txBody>
+          <a:bodyPr/>
+          <a:lstStyle/>
+          <a:p>
+            <a:r>
+              <a:rPr lang="de-DE" dirty="0"/>
+              <a:t>Transaction </a:t>
+            </a:r>
+            <a:r>
+              <a:rPr lang="de-DE" dirty="0" err="1"/>
+              <a:t>Malleability</a:t>
+            </a:r>
+            <a:endParaRPr lang="de-DE" dirty="0"/>
+          </a:p>
+        </p:txBody>
+      </p:sp>
+      <p:sp>
+        <p:nvSpPr>
+          <p:cNvPr id="3" name="Inhaltsplatzhalter 2">
+            <a:extLst>
+              <a:ext uri="{FF2B5EF4-FFF2-40B4-BE49-F238E27FC236}">
+                <a16:creationId xmlns:a16="http://schemas.microsoft.com/office/drawing/2014/main" id="{27C1726F-F789-4B66-99C1-6AFA51334997}"/>
+              </a:ext>
+            </a:extLst>
+          </p:cNvPr>
+          <p:cNvSpPr>
+            <a:spLocks noGrp="1"/>
+          </p:cNvSpPr>
+          <p:nvPr>
+            <p:ph idx="1"/>
+          </p:nvPr>
+        </p:nvSpPr>
+        <p:spPr/>
+        <p:txBody>
+          <a:bodyPr/>
+          <a:lstStyle/>
+          <a:p>
+            <a:r>
+              <a:rPr lang="de-DE" dirty="0"/>
+              <a:t>Transaction ID verändert nachdem sie signiert ist</a:t>
+            </a:r>
+          </a:p>
+          <a:p>
+            <a:pPr marL="0" indent="0">
+              <a:buNone/>
+            </a:pPr>
+            <a:endParaRPr lang="de-DE" dirty="0"/>
+          </a:p>
+          <a:p>
+            <a:r>
+              <a:rPr lang="de-DE" dirty="0"/>
+              <a:t>Angriff ermöglicht Double-</a:t>
+            </a:r>
+            <a:r>
+              <a:rPr lang="de-DE" dirty="0" err="1"/>
+              <a:t>Spend</a:t>
+            </a:r>
+            <a:endParaRPr lang="de-DE" dirty="0"/>
+          </a:p>
+        </p:txBody>
+      </p:sp>
+      <p:sp>
+        <p:nvSpPr>
+          <p:cNvPr id="4" name="Fußzeilenplatzhalter 3">
+            <a:extLst>
+              <a:ext uri="{FF2B5EF4-FFF2-40B4-BE49-F238E27FC236}">
+                <a16:creationId xmlns:a16="http://schemas.microsoft.com/office/drawing/2014/main" id="{3C7D360D-5BE3-4D85-913A-F68A854EFFC8}"/>
+              </a:ext>
+            </a:extLst>
+          </p:cNvPr>
+          <p:cNvSpPr>
+            <a:spLocks noGrp="1"/>
+          </p:cNvSpPr>
+          <p:nvPr>
+            <p:ph type="ftr" sz="quarter" idx="10"/>
+          </p:nvPr>
+        </p:nvSpPr>
+        <p:spPr/>
+        <p:txBody>
+          <a:bodyPr/>
+          <a:lstStyle/>
+          <a:p>
+            <a:r>
+              <a:rPr lang="de-DE" altLang="de-DE" noProof="0"/>
+              <a:t>Stefan Krieg - Segregated Witness</a:t>
+            </a:r>
+            <a:endParaRPr lang="de-DE" altLang="de-DE" noProof="0" dirty="0"/>
+          </a:p>
+        </p:txBody>
+      </p:sp>
+      <p:sp>
+        <p:nvSpPr>
+          <p:cNvPr id="5" name="Datumsplatzhalter 4">
+            <a:extLst>
+              <a:ext uri="{FF2B5EF4-FFF2-40B4-BE49-F238E27FC236}">
+                <a16:creationId xmlns:a16="http://schemas.microsoft.com/office/drawing/2014/main" id="{0771B757-8CDA-4516-9203-96A05263146F}"/>
+              </a:ext>
+            </a:extLst>
+          </p:cNvPr>
+          <p:cNvSpPr>
+            <a:spLocks noGrp="1"/>
+          </p:cNvSpPr>
+          <p:nvPr>
+            <p:ph type="dt" sz="half" idx="2"/>
+          </p:nvPr>
+        </p:nvSpPr>
+        <p:spPr/>
+        <p:txBody>
+          <a:bodyPr/>
+          <a:lstStyle/>
+          <a:p>
+            <a:fld id="{7A7A0B3B-8EF1-43DB-9A05-9913B3E55C42}" type="datetime1">
+              <a:rPr lang="de-DE" noProof="0" smtClean="0"/>
+              <a:t>05.07.2020</a:t>
+            </a:fld>
+            <a:endParaRPr lang="de-DE" noProof="0" dirty="0"/>
+          </a:p>
+        </p:txBody>
+      </p:sp>
+    </p:spTree>
+    <p:extLst>
+      <p:ext uri="{BB962C8B-B14F-4D97-AF65-F5344CB8AC3E}">
+        <p14:creationId xmlns:p14="http://schemas.microsoft.com/office/powerpoint/2010/main" val="1305902505"/>
       </p:ext>
     </p:extLst>
   </p:cSld>

</xml_diff>